<commit_message>
Override Global SASS Variables in Ionic Applications
</commit_message>
<xml_diff>
--- a/3. Design and Themes/Design and Theme.pptx
+++ b/3. Design and Themes/Design and Theme.pptx
@@ -5,7 +5,7 @@
     <p:sldMasterId id="2147483648" r:id="rId1"/>
   </p:sldMasterIdLst>
   <p:notesMasterIdLst>
-    <p:notesMasterId r:id="rId9"/>
+    <p:notesMasterId r:id="rId14"/>
   </p:notesMasterIdLst>
   <p:sldIdLst>
     <p:sldId id="256" r:id="rId2"/>
@@ -15,6 +15,11 @@
     <p:sldId id="260" r:id="rId6"/>
     <p:sldId id="261" r:id="rId7"/>
     <p:sldId id="263" r:id="rId8"/>
+    <p:sldId id="264" r:id="rId9"/>
+    <p:sldId id="265" r:id="rId10"/>
+    <p:sldId id="266" r:id="rId11"/>
+    <p:sldId id="267" r:id="rId12"/>
+    <p:sldId id="268" r:id="rId13"/>
   </p:sldIdLst>
   <p:sldSz cx="12192000" cy="6858000"/>
   <p:notesSz cx="6858000" cy="9144000"/>
@@ -675,6 +680,710 @@
     <p:extLst>
       <p:ext uri="{BB962C8B-B14F-4D97-AF65-F5344CB8AC3E}">
         <p14:creationId xmlns:p14="http://schemas.microsoft.com/office/powerpoint/2010/main" val="302075242"/>
+      </p:ext>
+    </p:extLst>
+  </p:cSld>
+  <p:clrMapOvr>
+    <a:masterClrMapping/>
+  </p:clrMapOvr>
+</p:notes>
+</file>
+
+<file path=ppt/notesSlides/notesSlide2.xml><?xml version="1.0" encoding="utf-8"?>
+<p:notes xmlns:a="http://schemas.openxmlformats.org/drawingml/2006/main" xmlns:r="http://schemas.openxmlformats.org/officeDocument/2006/relationships" xmlns:p="http://schemas.openxmlformats.org/presentationml/2006/main">
+  <p:cSld>
+    <p:spTree>
+      <p:nvGrpSpPr>
+        <p:cNvPr id="1" name=""/>
+        <p:cNvGrpSpPr/>
+        <p:nvPr/>
+      </p:nvGrpSpPr>
+      <p:grpSpPr>
+        <a:xfrm>
+          <a:off x="0" y="0"/>
+          <a:ext cx="0" cy="0"/>
+          <a:chOff x="0" y="0"/>
+          <a:chExt cx="0" cy="0"/>
+        </a:xfrm>
+      </p:grpSpPr>
+      <p:sp>
+        <p:nvSpPr>
+          <p:cNvPr id="2" name="Slide Image Placeholder 1"/>
+          <p:cNvSpPr>
+            <a:spLocks noGrp="1" noRot="1" noChangeAspect="1"/>
+          </p:cNvSpPr>
+          <p:nvPr>
+            <p:ph type="sldImg"/>
+          </p:nvPr>
+        </p:nvSpPr>
+        <p:spPr/>
+      </p:sp>
+      <p:sp>
+        <p:nvSpPr>
+          <p:cNvPr id="3" name="Notes Placeholder 2"/>
+          <p:cNvSpPr>
+            <a:spLocks noGrp="1"/>
+          </p:cNvSpPr>
+          <p:nvPr>
+            <p:ph type="body" idx="1"/>
+          </p:nvPr>
+        </p:nvSpPr>
+        <p:spPr/>
+        <p:txBody>
+          <a:bodyPr/>
+          <a:lstStyle/>
+          <a:p>
+            <a:r>
+              <a:rPr lang="en-ID" sz="1200" b="0" i="0" kern="1200" dirty="0">
+                <a:solidFill>
+                  <a:schemeClr val="tx1"/>
+                </a:solidFill>
+                <a:effectLst/>
+                <a:latin typeface="+mn-lt"/>
+                <a:ea typeface="+mn-ea"/>
+                <a:cs typeface="+mn-cs"/>
+              </a:rPr>
+              <a:t>When styling Ionic components, it's best to see if there is an existing SASS variable that you can set directly.</a:t>
+            </a:r>
+          </a:p>
+          <a:p>
+            <a:r>
+              <a:rPr lang="en-ID" sz="1200" b="0" i="0" kern="1200" dirty="0">
+                <a:solidFill>
+                  <a:schemeClr val="tx1"/>
+                </a:solidFill>
+                <a:effectLst/>
+                <a:latin typeface="+mn-lt"/>
+                <a:ea typeface="+mn-ea"/>
+                <a:cs typeface="+mn-cs"/>
+              </a:rPr>
+              <a:t>Here, we have the basics of a login form. Two inputs and a login button.</a:t>
+            </a:r>
+          </a:p>
+          <a:p>
+            <a:endParaRPr lang="en-US" dirty="0"/>
+          </a:p>
+        </p:txBody>
+      </p:sp>
+      <p:sp>
+        <p:nvSpPr>
+          <p:cNvPr id="4" name="Slide Number Placeholder 3"/>
+          <p:cNvSpPr>
+            <a:spLocks noGrp="1"/>
+          </p:cNvSpPr>
+          <p:nvPr>
+            <p:ph type="sldNum" sz="quarter" idx="10"/>
+          </p:nvPr>
+        </p:nvSpPr>
+        <p:spPr/>
+        <p:txBody>
+          <a:bodyPr/>
+          <a:lstStyle/>
+          <a:p>
+            <a:fld id="{FBFDB2CD-4BE4-A34F-8525-4BCDFACD1891}" type="slidenum">
+              <a:rPr lang="en-US" smtClean="0"/>
+              <a:t>8</a:t>
+            </a:fld>
+            <a:endParaRPr lang="en-US"/>
+          </a:p>
+        </p:txBody>
+      </p:sp>
+    </p:spTree>
+    <p:extLst>
+      <p:ext uri="{BB962C8B-B14F-4D97-AF65-F5344CB8AC3E}">
+        <p14:creationId xmlns:p14="http://schemas.microsoft.com/office/powerpoint/2010/main" val="2477550054"/>
+      </p:ext>
+    </p:extLst>
+  </p:cSld>
+  <p:clrMapOvr>
+    <a:masterClrMapping/>
+  </p:clrMapOvr>
+</p:notes>
+</file>
+
+<file path=ppt/notesSlides/notesSlide3.xml><?xml version="1.0" encoding="utf-8"?>
+<p:notes xmlns:a="http://schemas.openxmlformats.org/drawingml/2006/main" xmlns:r="http://schemas.openxmlformats.org/officeDocument/2006/relationships" xmlns:p="http://schemas.openxmlformats.org/presentationml/2006/main">
+  <p:cSld>
+    <p:spTree>
+      <p:nvGrpSpPr>
+        <p:cNvPr id="1" name=""/>
+        <p:cNvGrpSpPr/>
+        <p:nvPr/>
+      </p:nvGrpSpPr>
+      <p:grpSpPr>
+        <a:xfrm>
+          <a:off x="0" y="0"/>
+          <a:ext cx="0" cy="0"/>
+          <a:chOff x="0" y="0"/>
+          <a:chExt cx="0" cy="0"/>
+        </a:xfrm>
+      </p:grpSpPr>
+      <p:sp>
+        <p:nvSpPr>
+          <p:cNvPr id="2" name="Slide Image Placeholder 1"/>
+          <p:cNvSpPr>
+            <a:spLocks noGrp="1" noRot="1" noChangeAspect="1"/>
+          </p:cNvSpPr>
+          <p:nvPr>
+            <p:ph type="sldImg"/>
+          </p:nvPr>
+        </p:nvSpPr>
+        <p:spPr/>
+      </p:sp>
+      <p:sp>
+        <p:nvSpPr>
+          <p:cNvPr id="3" name="Notes Placeholder 2"/>
+          <p:cNvSpPr>
+            <a:spLocks noGrp="1"/>
+          </p:cNvSpPr>
+          <p:nvPr>
+            <p:ph type="body" idx="1"/>
+          </p:nvPr>
+        </p:nvSpPr>
+        <p:spPr/>
+        <p:txBody>
+          <a:bodyPr/>
+          <a:lstStyle/>
+          <a:p>
+            <a:r>
+              <a:rPr lang="en-ID" sz="1200" b="0" i="0" kern="1200" dirty="0">
+                <a:solidFill>
+                  <a:schemeClr val="tx1"/>
+                </a:solidFill>
+                <a:effectLst/>
+                <a:latin typeface="+mn-lt"/>
+                <a:ea typeface="+mn-ea"/>
+                <a:cs typeface="+mn-cs"/>
+              </a:rPr>
+              <a:t>When styling Ionic components, it's best to see if there is an existing SASS variable that you can set directly.</a:t>
+            </a:r>
+          </a:p>
+          <a:p>
+            <a:r>
+              <a:rPr lang="en-ID" sz="1200" b="0" i="0" kern="1200" dirty="0">
+                <a:solidFill>
+                  <a:schemeClr val="tx1"/>
+                </a:solidFill>
+                <a:effectLst/>
+                <a:latin typeface="+mn-lt"/>
+                <a:ea typeface="+mn-ea"/>
+                <a:cs typeface="+mn-cs"/>
+              </a:rPr>
+              <a:t>Here, we have the basics of a login form. Two inputs and a login button.</a:t>
+            </a:r>
+          </a:p>
+          <a:p>
+            <a:endParaRPr lang="en-US" dirty="0"/>
+          </a:p>
+        </p:txBody>
+      </p:sp>
+      <p:sp>
+        <p:nvSpPr>
+          <p:cNvPr id="4" name="Slide Number Placeholder 3"/>
+          <p:cNvSpPr>
+            <a:spLocks noGrp="1"/>
+          </p:cNvSpPr>
+          <p:nvPr>
+            <p:ph type="sldNum" sz="quarter" idx="10"/>
+          </p:nvPr>
+        </p:nvSpPr>
+        <p:spPr/>
+        <p:txBody>
+          <a:bodyPr/>
+          <a:lstStyle/>
+          <a:p>
+            <a:fld id="{FBFDB2CD-4BE4-A34F-8525-4BCDFACD1891}" type="slidenum">
+              <a:rPr lang="en-US" smtClean="0"/>
+              <a:t>9</a:t>
+            </a:fld>
+            <a:endParaRPr lang="en-US"/>
+          </a:p>
+        </p:txBody>
+      </p:sp>
+    </p:spTree>
+    <p:extLst>
+      <p:ext uri="{BB962C8B-B14F-4D97-AF65-F5344CB8AC3E}">
+        <p14:creationId xmlns:p14="http://schemas.microsoft.com/office/powerpoint/2010/main" val="2224415591"/>
+      </p:ext>
+    </p:extLst>
+  </p:cSld>
+  <p:clrMapOvr>
+    <a:masterClrMapping/>
+  </p:clrMapOvr>
+</p:notes>
+</file>
+
+<file path=ppt/notesSlides/notesSlide4.xml><?xml version="1.0" encoding="utf-8"?>
+<p:notes xmlns:a="http://schemas.openxmlformats.org/drawingml/2006/main" xmlns:r="http://schemas.openxmlformats.org/officeDocument/2006/relationships" xmlns:p="http://schemas.openxmlformats.org/presentationml/2006/main">
+  <p:cSld>
+    <p:spTree>
+      <p:nvGrpSpPr>
+        <p:cNvPr id="1" name=""/>
+        <p:cNvGrpSpPr/>
+        <p:nvPr/>
+      </p:nvGrpSpPr>
+      <p:grpSpPr>
+        <a:xfrm>
+          <a:off x="0" y="0"/>
+          <a:ext cx="0" cy="0"/>
+          <a:chOff x="0" y="0"/>
+          <a:chExt cx="0" cy="0"/>
+        </a:xfrm>
+      </p:grpSpPr>
+      <p:sp>
+        <p:nvSpPr>
+          <p:cNvPr id="2" name="Slide Image Placeholder 1"/>
+          <p:cNvSpPr>
+            <a:spLocks noGrp="1" noRot="1" noChangeAspect="1"/>
+          </p:cNvSpPr>
+          <p:nvPr>
+            <p:ph type="sldImg"/>
+          </p:nvPr>
+        </p:nvSpPr>
+        <p:spPr/>
+      </p:sp>
+      <p:sp>
+        <p:nvSpPr>
+          <p:cNvPr id="3" name="Notes Placeholder 2"/>
+          <p:cNvSpPr>
+            <a:spLocks noGrp="1"/>
+          </p:cNvSpPr>
+          <p:nvPr>
+            <p:ph type="body" idx="1"/>
+          </p:nvPr>
+        </p:nvSpPr>
+        <p:spPr/>
+        <p:txBody>
+          <a:bodyPr/>
+          <a:lstStyle/>
+          <a:p>
+            <a:r>
+              <a:rPr lang="en-ID" sz="1200" b="0" i="0" kern="1200" dirty="0">
+                <a:solidFill>
+                  <a:schemeClr val="tx1"/>
+                </a:solidFill>
+                <a:effectLst/>
+                <a:latin typeface="+mn-lt"/>
+                <a:ea typeface="+mn-ea"/>
+                <a:cs typeface="+mn-cs"/>
+              </a:rPr>
+              <a:t>To move the inputs over, we need to understand what is causing them to be shifted to the right. Opening Chrome's dev tools and using the elements inspector, we can select each of the DOM elements until we find the </a:t>
+            </a:r>
+            <a:r>
+              <a:rPr lang="en-ID" dirty="0"/>
+              <a:t>ion-item</a:t>
+            </a:r>
+            <a:r>
+              <a:rPr lang="en-ID" sz="1200" b="0" i="0" kern="1200" dirty="0">
+                <a:solidFill>
+                  <a:schemeClr val="tx1"/>
+                </a:solidFill>
+                <a:effectLst/>
+                <a:latin typeface="+mn-lt"/>
+                <a:ea typeface="+mn-ea"/>
+                <a:cs typeface="+mn-cs"/>
+              </a:rPr>
+              <a:t> that is introducing the </a:t>
+            </a:r>
+            <a:r>
+              <a:rPr lang="en-ID" dirty="0"/>
+              <a:t>padding-left</a:t>
+            </a:r>
+            <a:r>
+              <a:rPr lang="en-ID" sz="1200" b="0" i="0" kern="1200" dirty="0">
+                <a:solidFill>
+                  <a:schemeClr val="tx1"/>
+                </a:solidFill>
+                <a:effectLst/>
+                <a:latin typeface="+mn-lt"/>
+                <a:ea typeface="+mn-ea"/>
+                <a:cs typeface="+mn-cs"/>
+              </a:rPr>
+              <a:t> that is shifting our inputs over.</a:t>
+            </a:r>
+            <a:endParaRPr lang="en-US" dirty="0"/>
+          </a:p>
+        </p:txBody>
+      </p:sp>
+      <p:sp>
+        <p:nvSpPr>
+          <p:cNvPr id="4" name="Slide Number Placeholder 3"/>
+          <p:cNvSpPr>
+            <a:spLocks noGrp="1"/>
+          </p:cNvSpPr>
+          <p:nvPr>
+            <p:ph type="sldNum" sz="quarter" idx="10"/>
+          </p:nvPr>
+        </p:nvSpPr>
+        <p:spPr/>
+        <p:txBody>
+          <a:bodyPr/>
+          <a:lstStyle/>
+          <a:p>
+            <a:fld id="{FBFDB2CD-4BE4-A34F-8525-4BCDFACD1891}" type="slidenum">
+              <a:rPr lang="en-US" smtClean="0"/>
+              <a:t>10</a:t>
+            </a:fld>
+            <a:endParaRPr lang="en-US"/>
+          </a:p>
+        </p:txBody>
+      </p:sp>
+    </p:spTree>
+    <p:extLst>
+      <p:ext uri="{BB962C8B-B14F-4D97-AF65-F5344CB8AC3E}">
+        <p14:creationId xmlns:p14="http://schemas.microsoft.com/office/powerpoint/2010/main" val="1200345767"/>
+      </p:ext>
+    </p:extLst>
+  </p:cSld>
+  <p:clrMapOvr>
+    <a:masterClrMapping/>
+  </p:clrMapOvr>
+</p:notes>
+</file>
+
+<file path=ppt/notesSlides/notesSlide5.xml><?xml version="1.0" encoding="utf-8"?>
+<p:notes xmlns:a="http://schemas.openxmlformats.org/drawingml/2006/main" xmlns:r="http://schemas.openxmlformats.org/officeDocument/2006/relationships" xmlns:p="http://schemas.openxmlformats.org/presentationml/2006/main">
+  <p:cSld>
+    <p:spTree>
+      <p:nvGrpSpPr>
+        <p:cNvPr id="1" name=""/>
+        <p:cNvGrpSpPr/>
+        <p:nvPr/>
+      </p:nvGrpSpPr>
+      <p:grpSpPr>
+        <a:xfrm>
+          <a:off x="0" y="0"/>
+          <a:ext cx="0" cy="0"/>
+          <a:chOff x="0" y="0"/>
+          <a:chExt cx="0" cy="0"/>
+        </a:xfrm>
+      </p:grpSpPr>
+      <p:sp>
+        <p:nvSpPr>
+          <p:cNvPr id="2" name="Slide Image Placeholder 1"/>
+          <p:cNvSpPr>
+            <a:spLocks noGrp="1" noRot="1" noChangeAspect="1"/>
+          </p:cNvSpPr>
+          <p:nvPr>
+            <p:ph type="sldImg"/>
+          </p:nvPr>
+        </p:nvSpPr>
+        <p:spPr/>
+      </p:sp>
+      <p:sp>
+        <p:nvSpPr>
+          <p:cNvPr id="3" name="Notes Placeholder 2"/>
+          <p:cNvSpPr>
+            <a:spLocks noGrp="1"/>
+          </p:cNvSpPr>
+          <p:nvPr>
+            <p:ph type="body" idx="1"/>
+          </p:nvPr>
+        </p:nvSpPr>
+        <p:spPr/>
+        <p:txBody>
+          <a:bodyPr/>
+          <a:lstStyle/>
+          <a:p>
+            <a:r>
+              <a:rPr lang="en-ID" sz="1200" b="0" i="0" kern="1200" dirty="0">
+                <a:solidFill>
+                  <a:schemeClr val="tx1"/>
+                </a:solidFill>
+                <a:effectLst/>
+                <a:latin typeface="+mn-lt"/>
+                <a:ea typeface="+mn-ea"/>
+                <a:cs typeface="+mn-cs"/>
+              </a:rPr>
+              <a:t>Now, we could directly override these values, but I want to change this value globally in my application. To do this, first I'm going to see if the </a:t>
+            </a:r>
+            <a:r>
+              <a:rPr lang="en-ID" sz="1200" b="0" i="0" kern="1200" dirty="0">
+                <a:solidFill>
+                  <a:schemeClr val="tx1"/>
+                </a:solidFill>
+                <a:effectLst/>
+                <a:latin typeface="+mn-lt"/>
+                <a:ea typeface="+mn-ea"/>
+                <a:cs typeface="+mn-cs"/>
+                <a:hlinkClick r:id="rId3"/>
+              </a:rPr>
+              <a:t>Ionic framework</a:t>
+            </a:r>
+            <a:r>
+              <a:rPr lang="en-ID" sz="1200" b="0" i="0" kern="1200" dirty="0">
+                <a:solidFill>
+                  <a:schemeClr val="tx1"/>
+                </a:solidFill>
+                <a:effectLst/>
+                <a:latin typeface="+mn-lt"/>
+                <a:ea typeface="+mn-ea"/>
+                <a:cs typeface="+mn-cs"/>
+              </a:rPr>
+              <a:t> has exposed a SASS variable for this attribute.</a:t>
+            </a:r>
+          </a:p>
+          <a:p>
+            <a:endParaRPr lang="en-ID" sz="1200" b="0" i="0" kern="1200" dirty="0">
+              <a:solidFill>
+                <a:schemeClr val="tx1"/>
+              </a:solidFill>
+              <a:effectLst/>
+              <a:latin typeface="+mn-lt"/>
+              <a:ea typeface="+mn-ea"/>
+              <a:cs typeface="+mn-cs"/>
+            </a:endParaRPr>
+          </a:p>
+          <a:p>
+            <a:r>
+              <a:rPr lang="en-ID" sz="1200" b="0" i="0" kern="1200" dirty="0">
+                <a:solidFill>
+                  <a:schemeClr val="tx1"/>
+                </a:solidFill>
+                <a:effectLst/>
+                <a:latin typeface="+mn-lt"/>
+                <a:ea typeface="+mn-ea"/>
+                <a:cs typeface="+mn-cs"/>
+              </a:rPr>
+              <a:t>If you go to the API section for that component, there is a listing of some of the SASS variable to use for that component. Since I do not see anything about padding or margins, I'm going to navigate over to the </a:t>
+            </a:r>
+            <a:r>
+              <a:rPr lang="en-ID" sz="1200" b="0" i="0" kern="1200" dirty="0">
+                <a:solidFill>
+                  <a:schemeClr val="tx1"/>
+                </a:solidFill>
+                <a:effectLst/>
+                <a:latin typeface="+mn-lt"/>
+                <a:ea typeface="+mn-ea"/>
+                <a:cs typeface="+mn-cs"/>
+                <a:hlinkClick r:id="rId4"/>
+              </a:rPr>
+              <a:t>overriding SASS variables page</a:t>
+            </a:r>
+            <a:r>
+              <a:rPr lang="en-ID" sz="1200" b="0" i="0" kern="1200" dirty="0">
+                <a:solidFill>
+                  <a:schemeClr val="tx1"/>
+                </a:solidFill>
+                <a:effectLst/>
+                <a:latin typeface="+mn-lt"/>
+                <a:ea typeface="+mn-ea"/>
+                <a:cs typeface="+mn-cs"/>
+              </a:rPr>
+              <a:t>.</a:t>
+            </a:r>
+          </a:p>
+          <a:p>
+            <a:endParaRPr lang="en-ID" sz="1200" b="0" i="0" kern="1200" dirty="0">
+              <a:solidFill>
+                <a:schemeClr val="tx1"/>
+              </a:solidFill>
+              <a:effectLst/>
+              <a:latin typeface="+mn-lt"/>
+              <a:ea typeface="+mn-ea"/>
+              <a:cs typeface="+mn-cs"/>
+            </a:endParaRPr>
+          </a:p>
+          <a:p>
+            <a:r>
+              <a:rPr lang="en-ID" sz="1200" b="0" i="0" kern="1200" dirty="0">
+                <a:solidFill>
+                  <a:schemeClr val="tx1"/>
+                </a:solidFill>
+                <a:effectLst/>
+                <a:latin typeface="+mn-lt"/>
+                <a:ea typeface="+mn-ea"/>
+                <a:cs typeface="+mn-cs"/>
+              </a:rPr>
+              <a:t>This page contains a listing of all the SASS variables used in Ionic. </a:t>
+            </a:r>
+          </a:p>
+          <a:p>
+            <a:endParaRPr lang="en-ID" sz="1200" b="0" i="0" kern="1200" dirty="0">
+              <a:solidFill>
+                <a:schemeClr val="tx1"/>
+              </a:solidFill>
+              <a:effectLst/>
+              <a:latin typeface="+mn-lt"/>
+              <a:ea typeface="+mn-ea"/>
+              <a:cs typeface="+mn-cs"/>
+            </a:endParaRPr>
+          </a:p>
+          <a:p>
+            <a:r>
+              <a:rPr lang="en-ID" sz="1200" b="0" i="0" kern="1200" dirty="0">
+                <a:solidFill>
+                  <a:schemeClr val="tx1"/>
+                </a:solidFill>
+                <a:effectLst/>
+                <a:latin typeface="+mn-lt"/>
+                <a:ea typeface="+mn-ea"/>
+                <a:cs typeface="+mn-cs"/>
+              </a:rPr>
+              <a:t>I'm going to search on item-</a:t>
+            </a:r>
+            <a:r>
+              <a:rPr lang="en-ID" sz="1200" b="0" i="0" kern="1200" dirty="0" err="1">
+                <a:solidFill>
+                  <a:schemeClr val="tx1"/>
+                </a:solidFill>
+                <a:effectLst/>
+                <a:latin typeface="+mn-lt"/>
+                <a:ea typeface="+mn-ea"/>
+                <a:cs typeface="+mn-cs"/>
+              </a:rPr>
+              <a:t>md.</a:t>
+            </a:r>
+            <a:r>
+              <a:rPr lang="en-ID" sz="1200" b="0" i="0" kern="1200" dirty="0">
+                <a:solidFill>
+                  <a:schemeClr val="tx1"/>
+                </a:solidFill>
+                <a:effectLst/>
+                <a:latin typeface="+mn-lt"/>
+                <a:ea typeface="+mn-ea"/>
+                <a:cs typeface="+mn-cs"/>
+              </a:rPr>
+              <a:t> This list new filters the variables for us. There's the exact name of the SASS variable we need, item-md-padding-left. The iOS-specific value would be item-</a:t>
+            </a:r>
+            <a:r>
+              <a:rPr lang="en-ID" sz="1200" b="0" i="0" kern="1200" dirty="0" err="1">
+                <a:solidFill>
+                  <a:schemeClr val="tx1"/>
+                </a:solidFill>
+                <a:effectLst/>
+                <a:latin typeface="+mn-lt"/>
+                <a:ea typeface="+mn-ea"/>
+                <a:cs typeface="+mn-cs"/>
+              </a:rPr>
+              <a:t>ios</a:t>
+            </a:r>
+            <a:r>
+              <a:rPr lang="en-ID" sz="1200" b="0" i="0" kern="1200" dirty="0">
+                <a:solidFill>
+                  <a:schemeClr val="tx1"/>
+                </a:solidFill>
+                <a:effectLst/>
+                <a:latin typeface="+mn-lt"/>
+                <a:ea typeface="+mn-ea"/>
+                <a:cs typeface="+mn-cs"/>
+              </a:rPr>
+              <a:t>-padding-left.</a:t>
+            </a:r>
+          </a:p>
+        </p:txBody>
+      </p:sp>
+      <p:sp>
+        <p:nvSpPr>
+          <p:cNvPr id="4" name="Slide Number Placeholder 3"/>
+          <p:cNvSpPr>
+            <a:spLocks noGrp="1"/>
+          </p:cNvSpPr>
+          <p:nvPr>
+            <p:ph type="sldNum" sz="quarter" idx="10"/>
+          </p:nvPr>
+        </p:nvSpPr>
+        <p:spPr/>
+        <p:txBody>
+          <a:bodyPr/>
+          <a:lstStyle/>
+          <a:p>
+            <a:fld id="{FBFDB2CD-4BE4-A34F-8525-4BCDFACD1891}" type="slidenum">
+              <a:rPr lang="en-US" smtClean="0"/>
+              <a:t>11</a:t>
+            </a:fld>
+            <a:endParaRPr lang="en-US"/>
+          </a:p>
+        </p:txBody>
+      </p:sp>
+    </p:spTree>
+    <p:extLst>
+      <p:ext uri="{BB962C8B-B14F-4D97-AF65-F5344CB8AC3E}">
+        <p14:creationId xmlns:p14="http://schemas.microsoft.com/office/powerpoint/2010/main" val="16487909"/>
+      </p:ext>
+    </p:extLst>
+  </p:cSld>
+  <p:clrMapOvr>
+    <a:masterClrMapping/>
+  </p:clrMapOvr>
+</p:notes>
+</file>
+
+<file path=ppt/notesSlides/notesSlide6.xml><?xml version="1.0" encoding="utf-8"?>
+<p:notes xmlns:a="http://schemas.openxmlformats.org/drawingml/2006/main" xmlns:r="http://schemas.openxmlformats.org/officeDocument/2006/relationships" xmlns:p="http://schemas.openxmlformats.org/presentationml/2006/main">
+  <p:cSld>
+    <p:spTree>
+      <p:nvGrpSpPr>
+        <p:cNvPr id="1" name=""/>
+        <p:cNvGrpSpPr/>
+        <p:nvPr/>
+      </p:nvGrpSpPr>
+      <p:grpSpPr>
+        <a:xfrm>
+          <a:off x="0" y="0"/>
+          <a:ext cx="0" cy="0"/>
+          <a:chOff x="0" y="0"/>
+          <a:chExt cx="0" cy="0"/>
+        </a:xfrm>
+      </p:grpSpPr>
+      <p:sp>
+        <p:nvSpPr>
+          <p:cNvPr id="2" name="Slide Image Placeholder 1"/>
+          <p:cNvSpPr>
+            <a:spLocks noGrp="1" noRot="1" noChangeAspect="1"/>
+          </p:cNvSpPr>
+          <p:nvPr>
+            <p:ph type="sldImg"/>
+          </p:nvPr>
+        </p:nvSpPr>
+        <p:spPr/>
+      </p:sp>
+      <p:sp>
+        <p:nvSpPr>
+          <p:cNvPr id="3" name="Notes Placeholder 2"/>
+          <p:cNvSpPr>
+            <a:spLocks noGrp="1"/>
+          </p:cNvSpPr>
+          <p:nvPr>
+            <p:ph type="body" idx="1"/>
+          </p:nvPr>
+        </p:nvSpPr>
+        <p:spPr/>
+        <p:txBody>
+          <a:bodyPr/>
+          <a:lstStyle/>
+          <a:p>
+            <a:endParaRPr lang="en-US" dirty="0"/>
+          </a:p>
+        </p:txBody>
+      </p:sp>
+      <p:sp>
+        <p:nvSpPr>
+          <p:cNvPr id="4" name="Slide Number Placeholder 3"/>
+          <p:cNvSpPr>
+            <a:spLocks noGrp="1"/>
+          </p:cNvSpPr>
+          <p:nvPr>
+            <p:ph type="sldNum" sz="quarter" idx="10"/>
+          </p:nvPr>
+        </p:nvSpPr>
+        <p:spPr/>
+        <p:txBody>
+          <a:bodyPr/>
+          <a:lstStyle/>
+          <a:p>
+            <a:fld id="{FBFDB2CD-4BE4-A34F-8525-4BCDFACD1891}" type="slidenum">
+              <a:rPr lang="en-US" smtClean="0"/>
+              <a:t>12</a:t>
+            </a:fld>
+            <a:endParaRPr lang="en-US"/>
+          </a:p>
+        </p:txBody>
+      </p:sp>
+    </p:spTree>
+    <p:extLst>
+      <p:ext uri="{BB962C8B-B14F-4D97-AF65-F5344CB8AC3E}">
+        <p14:creationId xmlns:p14="http://schemas.microsoft.com/office/powerpoint/2010/main" val="443728169"/>
       </p:ext>
     </p:extLst>
   </p:cSld>
@@ -4195,6 +4904,581 @@
 </p:sld>
 </file>
 
+<file path=ppt/slides/slide10.xml><?xml version="1.0" encoding="utf-8"?>
+<p:sld xmlns:a="http://schemas.openxmlformats.org/drawingml/2006/main" xmlns:r="http://schemas.openxmlformats.org/officeDocument/2006/relationships" xmlns:p="http://schemas.openxmlformats.org/presentationml/2006/main">
+  <p:cSld>
+    <p:spTree>
+      <p:nvGrpSpPr>
+        <p:cNvPr id="1" name=""/>
+        <p:cNvGrpSpPr/>
+        <p:nvPr/>
+      </p:nvGrpSpPr>
+      <p:grpSpPr>
+        <a:xfrm>
+          <a:off x="0" y="0"/>
+          <a:ext cx="0" cy="0"/>
+          <a:chOff x="0" y="0"/>
+          <a:chExt cx="0" cy="0"/>
+        </a:xfrm>
+      </p:grpSpPr>
+      <p:sp>
+        <p:nvSpPr>
+          <p:cNvPr id="2" name="Title 1">
+            <a:extLst>
+              <a:ext uri="{FF2B5EF4-FFF2-40B4-BE49-F238E27FC236}">
+                <a16:creationId xmlns:a16="http://schemas.microsoft.com/office/drawing/2014/main" id="{F8D9D734-5D67-AF4C-AB80-99D18AFC433A}"/>
+              </a:ext>
+            </a:extLst>
+          </p:cNvPr>
+          <p:cNvSpPr>
+            <a:spLocks noGrp="1"/>
+          </p:cNvSpPr>
+          <p:nvPr>
+            <p:ph type="title"/>
+          </p:nvPr>
+        </p:nvSpPr>
+        <p:spPr/>
+        <p:txBody>
+          <a:bodyPr>
+            <a:normAutofit/>
+          </a:bodyPr>
+          <a:lstStyle/>
+          <a:p>
+            <a:r>
+              <a:rPr lang="en-ID" sz="3600" dirty="0"/>
+              <a:t>Override Global SASS Variables in Ionic Applications</a:t>
+            </a:r>
+          </a:p>
+        </p:txBody>
+      </p:sp>
+      <p:pic>
+        <p:nvPicPr>
+          <p:cNvPr id="7" name="Picture 6">
+            <a:extLst>
+              <a:ext uri="{FF2B5EF4-FFF2-40B4-BE49-F238E27FC236}">
+                <a16:creationId xmlns:a16="http://schemas.microsoft.com/office/drawing/2014/main" id="{9E8DE318-5405-C849-B6E6-B7D1E0A1C361}"/>
+              </a:ext>
+            </a:extLst>
+          </p:cNvPr>
+          <p:cNvPicPr>
+            <a:picLocks noChangeAspect="1"/>
+          </p:cNvPicPr>
+          <p:nvPr/>
+        </p:nvPicPr>
+        <p:blipFill>
+          <a:blip r:embed="rId3"/>
+          <a:stretch>
+            <a:fillRect/>
+          </a:stretch>
+        </p:blipFill>
+        <p:spPr>
+          <a:xfrm>
+            <a:off x="3378932" y="3397585"/>
+            <a:ext cx="3335224" cy="3180497"/>
+          </a:xfrm>
+          <a:prstGeom prst="rect">
+            <a:avLst/>
+          </a:prstGeom>
+        </p:spPr>
+      </p:pic>
+      <p:pic>
+        <p:nvPicPr>
+          <p:cNvPr id="9" name="Picture 8">
+            <a:extLst>
+              <a:ext uri="{FF2B5EF4-FFF2-40B4-BE49-F238E27FC236}">
+                <a16:creationId xmlns:a16="http://schemas.microsoft.com/office/drawing/2014/main" id="{52DBA374-C534-2746-A2EB-9FEA4917C613}"/>
+              </a:ext>
+            </a:extLst>
+          </p:cNvPr>
+          <p:cNvPicPr>
+            <a:picLocks noChangeAspect="1"/>
+          </p:cNvPicPr>
+          <p:nvPr/>
+        </p:nvPicPr>
+        <p:blipFill>
+          <a:blip r:embed="rId4"/>
+          <a:stretch>
+            <a:fillRect/>
+          </a:stretch>
+        </p:blipFill>
+        <p:spPr>
+          <a:xfrm>
+            <a:off x="6714156" y="2361682"/>
+            <a:ext cx="5245100" cy="4216400"/>
+          </a:xfrm>
+          <a:prstGeom prst="rect">
+            <a:avLst/>
+          </a:prstGeom>
+        </p:spPr>
+      </p:pic>
+      <p:sp>
+        <p:nvSpPr>
+          <p:cNvPr id="10" name="TextBox 9">
+            <a:extLst>
+              <a:ext uri="{FF2B5EF4-FFF2-40B4-BE49-F238E27FC236}">
+                <a16:creationId xmlns:a16="http://schemas.microsoft.com/office/drawing/2014/main" id="{C57183AD-E983-664C-9E3C-E9E85BD6F127}"/>
+              </a:ext>
+            </a:extLst>
+          </p:cNvPr>
+          <p:cNvSpPr txBox="1"/>
+          <p:nvPr/>
+        </p:nvSpPr>
+        <p:spPr>
+          <a:xfrm>
+            <a:off x="236101" y="2464135"/>
+            <a:ext cx="6478055" cy="830997"/>
+          </a:xfrm>
+          <a:prstGeom prst="rect">
+            <a:avLst/>
+          </a:prstGeom>
+          <a:noFill/>
+        </p:spPr>
+        <p:txBody>
+          <a:bodyPr wrap="none" rtlCol="0">
+            <a:spAutoFit/>
+          </a:bodyPr>
+          <a:lstStyle/>
+          <a:p>
+            <a:pPr marL="457200" indent="-457200">
+              <a:buAutoNum type="arabicPeriod"/>
+            </a:pPr>
+            <a:r>
+              <a:rPr lang="en-ID" sz="2400" dirty="0">
+                <a:latin typeface="Helvetica Neue" panose="02000503000000020004" pitchFamily="2" charset="0"/>
+                <a:ea typeface="Helvetica Neue" panose="02000503000000020004" pitchFamily="2" charset="0"/>
+                <a:cs typeface="Helvetica Neue" panose="02000503000000020004" pitchFamily="2" charset="0"/>
+              </a:rPr>
+              <a:t>Open Inspect Element</a:t>
+            </a:r>
+          </a:p>
+          <a:p>
+            <a:pPr marL="457200" indent="-457200">
+              <a:buAutoNum type="arabicPeriod"/>
+            </a:pPr>
+            <a:r>
+              <a:rPr lang="en-ID" sz="2400" dirty="0">
+                <a:latin typeface="Helvetica Neue" panose="02000503000000020004" pitchFamily="2" charset="0"/>
+                <a:ea typeface="Helvetica Neue" panose="02000503000000020004" pitchFamily="2" charset="0"/>
+                <a:cs typeface="Helvetica Neue" panose="02000503000000020004" pitchFamily="2" charset="0"/>
+              </a:rPr>
+              <a:t>Select an element in this page to inspect it</a:t>
+            </a:r>
+            <a:endParaRPr lang="en-US" sz="2400" dirty="0">
+              <a:latin typeface="Helvetica Neue" panose="02000503000000020004" pitchFamily="2" charset="0"/>
+              <a:ea typeface="Helvetica Neue" panose="02000503000000020004" pitchFamily="2" charset="0"/>
+              <a:cs typeface="Helvetica Neue" panose="02000503000000020004" pitchFamily="2" charset="0"/>
+            </a:endParaRPr>
+          </a:p>
+        </p:txBody>
+      </p:sp>
+    </p:spTree>
+    <p:extLst>
+      <p:ext uri="{BB962C8B-B14F-4D97-AF65-F5344CB8AC3E}">
+        <p14:creationId xmlns:p14="http://schemas.microsoft.com/office/powerpoint/2010/main" val="4267783320"/>
+      </p:ext>
+    </p:extLst>
+  </p:cSld>
+  <p:clrMapOvr>
+    <a:masterClrMapping/>
+  </p:clrMapOvr>
+</p:sld>
+</file>
+
+<file path=ppt/slides/slide11.xml><?xml version="1.0" encoding="utf-8"?>
+<p:sld xmlns:a="http://schemas.openxmlformats.org/drawingml/2006/main" xmlns:r="http://schemas.openxmlformats.org/officeDocument/2006/relationships" xmlns:p="http://schemas.openxmlformats.org/presentationml/2006/main">
+  <p:cSld>
+    <p:spTree>
+      <p:nvGrpSpPr>
+        <p:cNvPr id="1" name=""/>
+        <p:cNvGrpSpPr/>
+        <p:nvPr/>
+      </p:nvGrpSpPr>
+      <p:grpSpPr>
+        <a:xfrm>
+          <a:off x="0" y="0"/>
+          <a:ext cx="0" cy="0"/>
+          <a:chOff x="0" y="0"/>
+          <a:chExt cx="0" cy="0"/>
+        </a:xfrm>
+      </p:grpSpPr>
+      <p:sp>
+        <p:nvSpPr>
+          <p:cNvPr id="2" name="Title 1">
+            <a:extLst>
+              <a:ext uri="{FF2B5EF4-FFF2-40B4-BE49-F238E27FC236}">
+                <a16:creationId xmlns:a16="http://schemas.microsoft.com/office/drawing/2014/main" id="{F8D9D734-5D67-AF4C-AB80-99D18AFC433A}"/>
+              </a:ext>
+            </a:extLst>
+          </p:cNvPr>
+          <p:cNvSpPr>
+            <a:spLocks noGrp="1"/>
+          </p:cNvSpPr>
+          <p:nvPr>
+            <p:ph type="title"/>
+          </p:nvPr>
+        </p:nvSpPr>
+        <p:spPr/>
+        <p:txBody>
+          <a:bodyPr>
+            <a:normAutofit/>
+          </a:bodyPr>
+          <a:lstStyle/>
+          <a:p>
+            <a:r>
+              <a:rPr lang="en-ID" sz="3600" dirty="0"/>
+              <a:t>Override Global SASS Variables in Ionic Applications</a:t>
+            </a:r>
+          </a:p>
+        </p:txBody>
+      </p:sp>
+      <p:pic>
+        <p:nvPicPr>
+          <p:cNvPr id="6" name="Picture 5">
+            <a:extLst>
+              <a:ext uri="{FF2B5EF4-FFF2-40B4-BE49-F238E27FC236}">
+                <a16:creationId xmlns:a16="http://schemas.microsoft.com/office/drawing/2014/main" id="{E62EC286-311D-8244-9601-AF89F7552B55}"/>
+              </a:ext>
+            </a:extLst>
+          </p:cNvPr>
+          <p:cNvPicPr>
+            <a:picLocks noChangeAspect="1"/>
+          </p:cNvPicPr>
+          <p:nvPr/>
+        </p:nvPicPr>
+        <p:blipFill>
+          <a:blip r:embed="rId3"/>
+          <a:stretch>
+            <a:fillRect/>
+          </a:stretch>
+        </p:blipFill>
+        <p:spPr>
+          <a:xfrm>
+            <a:off x="535345" y="1369008"/>
+            <a:ext cx="10934700" cy="2590482"/>
+          </a:xfrm>
+          <a:prstGeom prst="rect">
+            <a:avLst/>
+          </a:prstGeom>
+        </p:spPr>
+      </p:pic>
+      <p:pic>
+        <p:nvPicPr>
+          <p:cNvPr id="11" name="Picture 10">
+            <a:extLst>
+              <a:ext uri="{FF2B5EF4-FFF2-40B4-BE49-F238E27FC236}">
+                <a16:creationId xmlns:a16="http://schemas.microsoft.com/office/drawing/2014/main" id="{4BC8F1FF-0F46-9440-971F-21A01457D28E}"/>
+              </a:ext>
+            </a:extLst>
+          </p:cNvPr>
+          <p:cNvPicPr>
+            <a:picLocks noChangeAspect="1"/>
+          </p:cNvPicPr>
+          <p:nvPr/>
+        </p:nvPicPr>
+        <p:blipFill>
+          <a:blip r:embed="rId4"/>
+          <a:stretch>
+            <a:fillRect/>
+          </a:stretch>
+        </p:blipFill>
+        <p:spPr>
+          <a:xfrm>
+            <a:off x="535345" y="4201374"/>
+            <a:ext cx="11090988" cy="2337030"/>
+          </a:xfrm>
+          <a:prstGeom prst="rect">
+            <a:avLst/>
+          </a:prstGeom>
+        </p:spPr>
+      </p:pic>
+      <p:sp>
+        <p:nvSpPr>
+          <p:cNvPr id="12" name="Frame 11">
+            <a:extLst>
+              <a:ext uri="{FF2B5EF4-FFF2-40B4-BE49-F238E27FC236}">
+                <a16:creationId xmlns:a16="http://schemas.microsoft.com/office/drawing/2014/main" id="{24F51F1A-524C-D44F-AB84-0135BF26BC23}"/>
+              </a:ext>
+            </a:extLst>
+          </p:cNvPr>
+          <p:cNvSpPr/>
+          <p:nvPr/>
+        </p:nvSpPr>
+        <p:spPr>
+          <a:xfrm>
+            <a:off x="186613" y="2407298"/>
+            <a:ext cx="11681927" cy="765110"/>
+          </a:xfrm>
+          <a:prstGeom prst="frame">
+            <a:avLst/>
+          </a:prstGeom>
+          <a:solidFill>
+            <a:schemeClr val="accent2"/>
+          </a:solidFill>
+          <a:ln w="0">
+            <a:solidFill>
+              <a:schemeClr val="accent2"/>
+            </a:solidFill>
+          </a:ln>
+        </p:spPr>
+        <p:style>
+          <a:lnRef idx="2">
+            <a:schemeClr val="accent1">
+              <a:shade val="50000"/>
+            </a:schemeClr>
+          </a:lnRef>
+          <a:fillRef idx="1">
+            <a:schemeClr val="accent1"/>
+          </a:fillRef>
+          <a:effectRef idx="0">
+            <a:schemeClr val="accent1"/>
+          </a:effectRef>
+          <a:fontRef idx="minor">
+            <a:schemeClr val="lt1"/>
+          </a:fontRef>
+        </p:style>
+        <p:txBody>
+          <a:bodyPr rtlCol="0" anchor="ctr"/>
+          <a:lstStyle/>
+          <a:p>
+            <a:pPr algn="ctr"/>
+            <a:endParaRPr lang="en-US">
+              <a:solidFill>
+                <a:schemeClr val="tx1"/>
+              </a:solidFill>
+            </a:endParaRPr>
+          </a:p>
+        </p:txBody>
+      </p:sp>
+      <p:sp>
+        <p:nvSpPr>
+          <p:cNvPr id="13" name="Frame 12">
+            <a:extLst>
+              <a:ext uri="{FF2B5EF4-FFF2-40B4-BE49-F238E27FC236}">
+                <a16:creationId xmlns:a16="http://schemas.microsoft.com/office/drawing/2014/main" id="{2E1BDD23-86A1-F044-88C6-B2821BC29D2A}"/>
+              </a:ext>
+            </a:extLst>
+          </p:cNvPr>
+          <p:cNvSpPr/>
+          <p:nvPr/>
+        </p:nvSpPr>
+        <p:spPr>
+          <a:xfrm>
+            <a:off x="264369" y="5265572"/>
+            <a:ext cx="11681927" cy="765110"/>
+          </a:xfrm>
+          <a:prstGeom prst="frame">
+            <a:avLst/>
+          </a:prstGeom>
+          <a:solidFill>
+            <a:schemeClr val="accent2"/>
+          </a:solidFill>
+          <a:ln w="0">
+            <a:solidFill>
+              <a:schemeClr val="accent2"/>
+            </a:solidFill>
+          </a:ln>
+        </p:spPr>
+        <p:style>
+          <a:lnRef idx="2">
+            <a:schemeClr val="accent1">
+              <a:shade val="50000"/>
+            </a:schemeClr>
+          </a:lnRef>
+          <a:fillRef idx="1">
+            <a:schemeClr val="accent1"/>
+          </a:fillRef>
+          <a:effectRef idx="0">
+            <a:schemeClr val="accent1"/>
+          </a:effectRef>
+          <a:fontRef idx="minor">
+            <a:schemeClr val="lt1"/>
+          </a:fontRef>
+        </p:style>
+        <p:txBody>
+          <a:bodyPr rtlCol="0" anchor="ctr"/>
+          <a:lstStyle/>
+          <a:p>
+            <a:pPr algn="ctr"/>
+            <a:endParaRPr lang="en-US">
+              <a:solidFill>
+                <a:schemeClr val="tx1"/>
+              </a:solidFill>
+            </a:endParaRPr>
+          </a:p>
+        </p:txBody>
+      </p:sp>
+    </p:spTree>
+    <p:extLst>
+      <p:ext uri="{BB962C8B-B14F-4D97-AF65-F5344CB8AC3E}">
+        <p14:creationId xmlns:p14="http://schemas.microsoft.com/office/powerpoint/2010/main" val="2411951559"/>
+      </p:ext>
+    </p:extLst>
+  </p:cSld>
+  <p:clrMapOvr>
+    <a:masterClrMapping/>
+  </p:clrMapOvr>
+</p:sld>
+</file>
+
+<file path=ppt/slides/slide12.xml><?xml version="1.0" encoding="utf-8"?>
+<p:sld xmlns:a="http://schemas.openxmlformats.org/drawingml/2006/main" xmlns:r="http://schemas.openxmlformats.org/officeDocument/2006/relationships" xmlns:p="http://schemas.openxmlformats.org/presentationml/2006/main">
+  <p:cSld>
+    <p:spTree>
+      <p:nvGrpSpPr>
+        <p:cNvPr id="1" name=""/>
+        <p:cNvGrpSpPr/>
+        <p:nvPr/>
+      </p:nvGrpSpPr>
+      <p:grpSpPr>
+        <a:xfrm>
+          <a:off x="0" y="0"/>
+          <a:ext cx="0" cy="0"/>
+          <a:chOff x="0" y="0"/>
+          <a:chExt cx="0" cy="0"/>
+        </a:xfrm>
+      </p:grpSpPr>
+      <p:sp>
+        <p:nvSpPr>
+          <p:cNvPr id="2" name="Title 1">
+            <a:extLst>
+              <a:ext uri="{FF2B5EF4-FFF2-40B4-BE49-F238E27FC236}">
+                <a16:creationId xmlns:a16="http://schemas.microsoft.com/office/drawing/2014/main" id="{F8D9D734-5D67-AF4C-AB80-99D18AFC433A}"/>
+              </a:ext>
+            </a:extLst>
+          </p:cNvPr>
+          <p:cNvSpPr>
+            <a:spLocks noGrp="1"/>
+          </p:cNvSpPr>
+          <p:nvPr>
+            <p:ph type="title"/>
+          </p:nvPr>
+        </p:nvSpPr>
+        <p:spPr/>
+        <p:txBody>
+          <a:bodyPr>
+            <a:normAutofit/>
+          </a:bodyPr>
+          <a:lstStyle/>
+          <a:p>
+            <a:r>
+              <a:rPr lang="en-ID" sz="3600" dirty="0"/>
+              <a:t>Override Global SASS Variables in Ionic Applications</a:t>
+            </a:r>
+          </a:p>
+        </p:txBody>
+      </p:sp>
+      <p:pic>
+        <p:nvPicPr>
+          <p:cNvPr id="4" name="Picture 3">
+            <a:extLst>
+              <a:ext uri="{FF2B5EF4-FFF2-40B4-BE49-F238E27FC236}">
+                <a16:creationId xmlns:a16="http://schemas.microsoft.com/office/drawing/2014/main" id="{ECE9FE66-220E-EE4B-833C-86A32EEE1B00}"/>
+              </a:ext>
+            </a:extLst>
+          </p:cNvPr>
+          <p:cNvPicPr>
+            <a:picLocks noChangeAspect="1"/>
+          </p:cNvPicPr>
+          <p:nvPr/>
+        </p:nvPicPr>
+        <p:blipFill>
+          <a:blip r:embed="rId3"/>
+          <a:stretch>
+            <a:fillRect/>
+          </a:stretch>
+        </p:blipFill>
+        <p:spPr>
+          <a:xfrm>
+            <a:off x="2013080" y="1690688"/>
+            <a:ext cx="7746741" cy="2964457"/>
+          </a:xfrm>
+          <a:prstGeom prst="rect">
+            <a:avLst/>
+          </a:prstGeom>
+        </p:spPr>
+      </p:pic>
+      <p:pic>
+        <p:nvPicPr>
+          <p:cNvPr id="7" name="Picture 6">
+            <a:extLst>
+              <a:ext uri="{FF2B5EF4-FFF2-40B4-BE49-F238E27FC236}">
+                <a16:creationId xmlns:a16="http://schemas.microsoft.com/office/drawing/2014/main" id="{E4687923-426E-6D40-838F-FA40120356ED}"/>
+              </a:ext>
+            </a:extLst>
+          </p:cNvPr>
+          <p:cNvPicPr>
+            <a:picLocks noChangeAspect="1"/>
+          </p:cNvPicPr>
+          <p:nvPr/>
+        </p:nvPicPr>
+        <p:blipFill>
+          <a:blip r:embed="rId4"/>
+          <a:stretch>
+            <a:fillRect/>
+          </a:stretch>
+        </p:blipFill>
+        <p:spPr>
+          <a:xfrm>
+            <a:off x="2013080" y="5424240"/>
+            <a:ext cx="4829718" cy="1112935"/>
+          </a:xfrm>
+          <a:prstGeom prst="rect">
+            <a:avLst/>
+          </a:prstGeom>
+        </p:spPr>
+      </p:pic>
+      <p:sp>
+        <p:nvSpPr>
+          <p:cNvPr id="14" name="TextBox 13">
+            <a:extLst>
+              <a:ext uri="{FF2B5EF4-FFF2-40B4-BE49-F238E27FC236}">
+                <a16:creationId xmlns:a16="http://schemas.microsoft.com/office/drawing/2014/main" id="{B5F982DB-689D-674B-8338-1FE28279B310}"/>
+              </a:ext>
+            </a:extLst>
+          </p:cNvPr>
+          <p:cNvSpPr txBox="1"/>
+          <p:nvPr/>
+        </p:nvSpPr>
+        <p:spPr>
+          <a:xfrm>
+            <a:off x="2013080" y="4808860"/>
+            <a:ext cx="2122697" cy="461665"/>
+          </a:xfrm>
+          <a:prstGeom prst="rect">
+            <a:avLst/>
+          </a:prstGeom>
+          <a:noFill/>
+        </p:spPr>
+        <p:txBody>
+          <a:bodyPr wrap="none" rtlCol="0">
+            <a:spAutoFit/>
+          </a:bodyPr>
+          <a:lstStyle/>
+          <a:p>
+            <a:r>
+              <a:rPr lang="en-US" sz="2400" dirty="0">
+                <a:latin typeface="Helvetica Neue" panose="02000503000000020004" pitchFamily="2" charset="0"/>
+                <a:ea typeface="Helvetica Neue" panose="02000503000000020004" pitchFamily="2" charset="0"/>
+                <a:cs typeface="Helvetica Neue" panose="02000503000000020004" pitchFamily="2" charset="0"/>
+              </a:rPr>
+              <a:t>variables.scss</a:t>
+            </a:r>
+          </a:p>
+        </p:txBody>
+      </p:sp>
+    </p:spTree>
+    <p:extLst>
+      <p:ext uri="{BB962C8B-B14F-4D97-AF65-F5344CB8AC3E}">
+        <p14:creationId xmlns:p14="http://schemas.microsoft.com/office/powerpoint/2010/main" val="1986576456"/>
+      </p:ext>
+    </p:extLst>
+  </p:cSld>
+  <p:clrMapOvr>
+    <a:masterClrMapping/>
+  </p:clrMapOvr>
+</p:sld>
+</file>
+
 <file path=ppt/slides/slide2.xml><?xml version="1.0" encoding="utf-8"?>
 <p:sld xmlns:a="http://schemas.openxmlformats.org/drawingml/2006/main" xmlns:r="http://schemas.openxmlformats.org/officeDocument/2006/relationships" xmlns:p="http://schemas.openxmlformats.org/presentationml/2006/main">
   <p:cSld>
@@ -5256,6 +6540,414 @@
     <p:extLst>
       <p:ext uri="{BB962C8B-B14F-4D97-AF65-F5344CB8AC3E}">
         <p14:creationId xmlns:p14="http://schemas.microsoft.com/office/powerpoint/2010/main" val="1504237409"/>
+      </p:ext>
+    </p:extLst>
+  </p:cSld>
+  <p:clrMapOvr>
+    <a:masterClrMapping/>
+  </p:clrMapOvr>
+</p:sld>
+</file>
+
+<file path=ppt/slides/slide8.xml><?xml version="1.0" encoding="utf-8"?>
+<p:sld xmlns:a="http://schemas.openxmlformats.org/drawingml/2006/main" xmlns:r="http://schemas.openxmlformats.org/officeDocument/2006/relationships" xmlns:p="http://schemas.openxmlformats.org/presentationml/2006/main">
+  <p:cSld>
+    <p:spTree>
+      <p:nvGrpSpPr>
+        <p:cNvPr id="1" name=""/>
+        <p:cNvGrpSpPr/>
+        <p:nvPr/>
+      </p:nvGrpSpPr>
+      <p:grpSpPr>
+        <a:xfrm>
+          <a:off x="0" y="0"/>
+          <a:ext cx="0" cy="0"/>
+          <a:chOff x="0" y="0"/>
+          <a:chExt cx="0" cy="0"/>
+        </a:xfrm>
+      </p:grpSpPr>
+      <p:sp>
+        <p:nvSpPr>
+          <p:cNvPr id="2" name="Title 1">
+            <a:extLst>
+              <a:ext uri="{FF2B5EF4-FFF2-40B4-BE49-F238E27FC236}">
+                <a16:creationId xmlns:a16="http://schemas.microsoft.com/office/drawing/2014/main" id="{F8D9D734-5D67-AF4C-AB80-99D18AFC433A}"/>
+              </a:ext>
+            </a:extLst>
+          </p:cNvPr>
+          <p:cNvSpPr>
+            <a:spLocks noGrp="1"/>
+          </p:cNvSpPr>
+          <p:nvPr>
+            <p:ph type="title"/>
+          </p:nvPr>
+        </p:nvSpPr>
+        <p:spPr/>
+        <p:txBody>
+          <a:bodyPr>
+            <a:normAutofit/>
+          </a:bodyPr>
+          <a:lstStyle/>
+          <a:p>
+            <a:r>
+              <a:rPr lang="en-ID" sz="3600" dirty="0"/>
+              <a:t>Override Global SASS Variables in Ionic Applications</a:t>
+            </a:r>
+          </a:p>
+        </p:txBody>
+      </p:sp>
+      <p:pic>
+        <p:nvPicPr>
+          <p:cNvPr id="4" name="Picture 3">
+            <a:extLst>
+              <a:ext uri="{FF2B5EF4-FFF2-40B4-BE49-F238E27FC236}">
+                <a16:creationId xmlns:a16="http://schemas.microsoft.com/office/drawing/2014/main" id="{48BB8A78-379D-6941-B439-252A6E4C5983}"/>
+              </a:ext>
+            </a:extLst>
+          </p:cNvPr>
+          <p:cNvPicPr>
+            <a:picLocks noChangeAspect="1"/>
+          </p:cNvPicPr>
+          <p:nvPr/>
+        </p:nvPicPr>
+        <p:blipFill>
+          <a:blip r:embed="rId3"/>
+          <a:stretch>
+            <a:fillRect/>
+          </a:stretch>
+        </p:blipFill>
+        <p:spPr>
+          <a:xfrm>
+            <a:off x="1207851" y="1690688"/>
+            <a:ext cx="2559027" cy="4719839"/>
+          </a:xfrm>
+          <a:prstGeom prst="rect">
+            <a:avLst/>
+          </a:prstGeom>
+        </p:spPr>
+      </p:pic>
+      <p:cxnSp>
+        <p:nvCxnSpPr>
+          <p:cNvPr id="11" name="Elbow Connector 10">
+            <a:extLst>
+              <a:ext uri="{FF2B5EF4-FFF2-40B4-BE49-F238E27FC236}">
+                <a16:creationId xmlns:a16="http://schemas.microsoft.com/office/drawing/2014/main" id="{551C10DB-A90B-F243-B5A9-5B11757D0028}"/>
+              </a:ext>
+            </a:extLst>
+          </p:cNvPr>
+          <p:cNvCxnSpPr>
+            <a:cxnSpLocks/>
+          </p:cNvCxnSpPr>
+          <p:nvPr/>
+        </p:nvCxnSpPr>
+        <p:spPr>
+          <a:xfrm flipV="1">
+            <a:off x="3797410" y="2765011"/>
+            <a:ext cx="1581971" cy="1304799"/>
+          </a:xfrm>
+          <a:prstGeom prst="bentConnector3">
+            <a:avLst>
+              <a:gd name="adj1" fmla="val 50000"/>
+            </a:avLst>
+          </a:prstGeom>
+          <a:ln>
+            <a:tailEnd type="triangle"/>
+          </a:ln>
+        </p:spPr>
+        <p:style>
+          <a:lnRef idx="1">
+            <a:schemeClr val="accent1"/>
+          </a:lnRef>
+          <a:fillRef idx="0">
+            <a:schemeClr val="accent1"/>
+          </a:fillRef>
+          <a:effectRef idx="0">
+            <a:schemeClr val="accent1"/>
+          </a:effectRef>
+          <a:fontRef idx="minor">
+            <a:schemeClr val="tx1"/>
+          </a:fontRef>
+        </p:style>
+      </p:cxnSp>
+      <p:sp>
+        <p:nvSpPr>
+          <p:cNvPr id="13" name="TextBox 12">
+            <a:extLst>
+              <a:ext uri="{FF2B5EF4-FFF2-40B4-BE49-F238E27FC236}">
+                <a16:creationId xmlns:a16="http://schemas.microsoft.com/office/drawing/2014/main" id="{FCAD364D-F2E4-CD4C-A895-EF0456AD75C2}"/>
+              </a:ext>
+            </a:extLst>
+          </p:cNvPr>
+          <p:cNvSpPr txBox="1"/>
+          <p:nvPr/>
+        </p:nvSpPr>
+        <p:spPr>
+          <a:xfrm>
+            <a:off x="4132694" y="2326249"/>
+            <a:ext cx="1240532" cy="369332"/>
+          </a:xfrm>
+          <a:prstGeom prst="rect">
+            <a:avLst/>
+          </a:prstGeom>
+          <a:noFill/>
+        </p:spPr>
+        <p:txBody>
+          <a:bodyPr wrap="none" rtlCol="0">
+            <a:spAutoFit/>
+          </a:bodyPr>
+          <a:lstStyle/>
+          <a:p>
+            <a:r>
+              <a:rPr lang="en-US" b="1" dirty="0">
+                <a:solidFill>
+                  <a:srgbClr val="436FBF"/>
+                </a:solidFill>
+              </a:rPr>
+              <a:t>home.html</a:t>
+            </a:r>
+          </a:p>
+        </p:txBody>
+      </p:sp>
+      <p:pic>
+        <p:nvPicPr>
+          <p:cNvPr id="6" name="Picture 5">
+            <a:extLst>
+              <a:ext uri="{FF2B5EF4-FFF2-40B4-BE49-F238E27FC236}">
+                <a16:creationId xmlns:a16="http://schemas.microsoft.com/office/drawing/2014/main" id="{AAAB9B21-8C1D-4142-BEEA-926B402E2A66}"/>
+              </a:ext>
+            </a:extLst>
+          </p:cNvPr>
+          <p:cNvPicPr>
+            <a:picLocks noChangeAspect="1"/>
+          </p:cNvPicPr>
+          <p:nvPr/>
+        </p:nvPicPr>
+        <p:blipFill>
+          <a:blip r:embed="rId4"/>
+          <a:stretch>
+            <a:fillRect/>
+          </a:stretch>
+        </p:blipFill>
+        <p:spPr>
+          <a:xfrm>
+            <a:off x="5478401" y="1860270"/>
+            <a:ext cx="5972674" cy="4380673"/>
+          </a:xfrm>
+          <a:prstGeom prst="rect">
+            <a:avLst/>
+          </a:prstGeom>
+        </p:spPr>
+      </p:pic>
+    </p:spTree>
+    <p:extLst>
+      <p:ext uri="{BB962C8B-B14F-4D97-AF65-F5344CB8AC3E}">
+        <p14:creationId xmlns:p14="http://schemas.microsoft.com/office/powerpoint/2010/main" val="7361161"/>
+      </p:ext>
+    </p:extLst>
+  </p:cSld>
+  <p:clrMapOvr>
+    <a:masterClrMapping/>
+  </p:clrMapOvr>
+</p:sld>
+</file>
+
+<file path=ppt/slides/slide9.xml><?xml version="1.0" encoding="utf-8"?>
+<p:sld xmlns:a="http://schemas.openxmlformats.org/drawingml/2006/main" xmlns:r="http://schemas.openxmlformats.org/officeDocument/2006/relationships" xmlns:p="http://schemas.openxmlformats.org/presentationml/2006/main">
+  <p:cSld>
+    <p:spTree>
+      <p:nvGrpSpPr>
+        <p:cNvPr id="1" name=""/>
+        <p:cNvGrpSpPr/>
+        <p:nvPr/>
+      </p:nvGrpSpPr>
+      <p:grpSpPr>
+        <a:xfrm>
+          <a:off x="0" y="0"/>
+          <a:ext cx="0" cy="0"/>
+          <a:chOff x="0" y="0"/>
+          <a:chExt cx="0" cy="0"/>
+        </a:xfrm>
+      </p:grpSpPr>
+      <p:sp>
+        <p:nvSpPr>
+          <p:cNvPr id="2" name="Title 1">
+            <a:extLst>
+              <a:ext uri="{FF2B5EF4-FFF2-40B4-BE49-F238E27FC236}">
+                <a16:creationId xmlns:a16="http://schemas.microsoft.com/office/drawing/2014/main" id="{F8D9D734-5D67-AF4C-AB80-99D18AFC433A}"/>
+              </a:ext>
+            </a:extLst>
+          </p:cNvPr>
+          <p:cNvSpPr>
+            <a:spLocks noGrp="1"/>
+          </p:cNvSpPr>
+          <p:nvPr>
+            <p:ph type="title"/>
+          </p:nvPr>
+        </p:nvSpPr>
+        <p:spPr/>
+        <p:txBody>
+          <a:bodyPr>
+            <a:normAutofit/>
+          </a:bodyPr>
+          <a:lstStyle/>
+          <a:p>
+            <a:r>
+              <a:rPr lang="en-ID" sz="3600" dirty="0"/>
+              <a:t>Override Global SASS Variables in Ionic Applications</a:t>
+            </a:r>
+          </a:p>
+        </p:txBody>
+      </p:sp>
+      <p:pic>
+        <p:nvPicPr>
+          <p:cNvPr id="4" name="Picture 3">
+            <a:extLst>
+              <a:ext uri="{FF2B5EF4-FFF2-40B4-BE49-F238E27FC236}">
+                <a16:creationId xmlns:a16="http://schemas.microsoft.com/office/drawing/2014/main" id="{48BB8A78-379D-6941-B439-252A6E4C5983}"/>
+              </a:ext>
+            </a:extLst>
+          </p:cNvPr>
+          <p:cNvPicPr>
+            <a:picLocks noChangeAspect="1"/>
+          </p:cNvPicPr>
+          <p:nvPr/>
+        </p:nvPicPr>
+        <p:blipFill rotWithShape="1">
+          <a:blip r:embed="rId3"/>
+          <a:srcRect r="-1812" b="57090"/>
+          <a:stretch/>
+        </p:blipFill>
+        <p:spPr>
+          <a:xfrm>
+            <a:off x="3898641" y="2050311"/>
+            <a:ext cx="4371540" cy="3398177"/>
+          </a:xfrm>
+          <a:prstGeom prst="rect">
+            <a:avLst/>
+          </a:prstGeom>
+        </p:spPr>
+      </p:pic>
+      <p:sp>
+        <p:nvSpPr>
+          <p:cNvPr id="3" name="Frame 2">
+            <a:extLst>
+              <a:ext uri="{FF2B5EF4-FFF2-40B4-BE49-F238E27FC236}">
+                <a16:creationId xmlns:a16="http://schemas.microsoft.com/office/drawing/2014/main" id="{035B2E6D-C21D-124A-BA75-6329F3D1BD87}"/>
+              </a:ext>
+            </a:extLst>
+          </p:cNvPr>
+          <p:cNvSpPr/>
+          <p:nvPr/>
+        </p:nvSpPr>
+        <p:spPr>
+          <a:xfrm>
+            <a:off x="3898641" y="2990460"/>
+            <a:ext cx="561475" cy="2458028"/>
+          </a:xfrm>
+          <a:prstGeom prst="frame">
+            <a:avLst/>
+          </a:prstGeom>
+          <a:solidFill>
+            <a:schemeClr val="accent2"/>
+          </a:solidFill>
+          <a:ln>
+            <a:solidFill>
+              <a:schemeClr val="accent2"/>
+            </a:solidFill>
+          </a:ln>
+        </p:spPr>
+        <p:style>
+          <a:lnRef idx="2">
+            <a:schemeClr val="accent1">
+              <a:shade val="50000"/>
+            </a:schemeClr>
+          </a:lnRef>
+          <a:fillRef idx="1">
+            <a:schemeClr val="accent1"/>
+          </a:fillRef>
+          <a:effectRef idx="0">
+            <a:schemeClr val="accent1"/>
+          </a:effectRef>
+          <a:fontRef idx="minor">
+            <a:schemeClr val="lt1"/>
+          </a:fontRef>
+        </p:style>
+        <p:txBody>
+          <a:bodyPr rtlCol="0" anchor="ctr"/>
+          <a:lstStyle/>
+          <a:p>
+            <a:pPr algn="ctr"/>
+            <a:endParaRPr lang="en-US">
+              <a:solidFill>
+                <a:schemeClr val="tx1"/>
+              </a:solidFill>
+            </a:endParaRPr>
+          </a:p>
+        </p:txBody>
+      </p:sp>
+      <p:sp>
+        <p:nvSpPr>
+          <p:cNvPr id="5" name="TextBox 4">
+            <a:extLst>
+              <a:ext uri="{FF2B5EF4-FFF2-40B4-BE49-F238E27FC236}">
+                <a16:creationId xmlns:a16="http://schemas.microsoft.com/office/drawing/2014/main" id="{97678F7E-F596-034B-94EA-BBF492E41566}"/>
+              </a:ext>
+            </a:extLst>
+          </p:cNvPr>
+          <p:cNvSpPr txBox="1"/>
+          <p:nvPr/>
+        </p:nvSpPr>
+        <p:spPr>
+          <a:xfrm>
+            <a:off x="2765511" y="5592667"/>
+            <a:ext cx="6250429" cy="1107996"/>
+          </a:xfrm>
+          <a:prstGeom prst="rect">
+            <a:avLst/>
+          </a:prstGeom>
+          <a:noFill/>
+        </p:spPr>
+        <p:txBody>
+          <a:bodyPr wrap="none" rtlCol="0">
+            <a:spAutoFit/>
+          </a:bodyPr>
+          <a:lstStyle/>
+          <a:p>
+            <a:pPr algn="ctr"/>
+            <a:r>
+              <a:rPr lang="en-ID" sz="2200" dirty="0">
+                <a:latin typeface="Helvetica Neue" panose="02000503000000020004" pitchFamily="2" charset="0"/>
+                <a:ea typeface="Helvetica Neue" panose="02000503000000020004" pitchFamily="2" charset="0"/>
+                <a:cs typeface="Helvetica Neue" panose="02000503000000020004" pitchFamily="2" charset="0"/>
+              </a:rPr>
+              <a:t>As you can see, the alignment of the two inputs </a:t>
+            </a:r>
+          </a:p>
+          <a:p>
+            <a:pPr algn="ctr"/>
+            <a:r>
+              <a:rPr lang="en-ID" sz="2200" dirty="0">
+                <a:latin typeface="Helvetica Neue" panose="02000503000000020004" pitchFamily="2" charset="0"/>
+                <a:ea typeface="Helvetica Neue" panose="02000503000000020004" pitchFamily="2" charset="0"/>
+                <a:cs typeface="Helvetica Neue" panose="02000503000000020004" pitchFamily="2" charset="0"/>
+              </a:rPr>
+              <a:t>does not match the left edge of the button. </a:t>
+            </a:r>
+          </a:p>
+          <a:p>
+            <a:pPr algn="ctr"/>
+            <a:endParaRPr lang="en-US" sz="2200" dirty="0">
+              <a:latin typeface="Helvetica Neue" panose="02000503000000020004" pitchFamily="2" charset="0"/>
+              <a:ea typeface="Helvetica Neue" panose="02000503000000020004" pitchFamily="2" charset="0"/>
+              <a:cs typeface="Helvetica Neue" panose="02000503000000020004" pitchFamily="2" charset="0"/>
+            </a:endParaRPr>
+          </a:p>
+        </p:txBody>
+      </p:sp>
+    </p:spTree>
+    <p:extLst>
+      <p:ext uri="{BB962C8B-B14F-4D97-AF65-F5344CB8AC3E}">
+        <p14:creationId xmlns:p14="http://schemas.microsoft.com/office/powerpoint/2010/main" val="203568269"/>
       </p:ext>
     </p:extLst>
   </p:cSld>

</xml_diff>

<commit_message>
Style an Ionic Component on a Single Page
</commit_message>
<xml_diff>
--- a/3. Design and Themes/Design and Theme.pptx
+++ b/3. Design and Themes/Design and Theme.pptx
@@ -5,7 +5,7 @@
     <p:sldMasterId id="2147483648" r:id="rId1"/>
   </p:sldMasterIdLst>
   <p:notesMasterIdLst>
-    <p:notesMasterId r:id="rId17"/>
+    <p:notesMasterId r:id="rId20"/>
   </p:notesMasterIdLst>
   <p:sldIdLst>
     <p:sldId id="256" r:id="rId2"/>
@@ -23,6 +23,9 @@
     <p:sldId id="271" r:id="rId14"/>
     <p:sldId id="272" r:id="rId15"/>
     <p:sldId id="273" r:id="rId16"/>
+    <p:sldId id="274" r:id="rId17"/>
+    <p:sldId id="276" r:id="rId18"/>
+    <p:sldId id="275" r:id="rId19"/>
   </p:sldIdLst>
   <p:sldSz cx="12192000" cy="6858000"/>
   <p:notesSz cx="6858000" cy="9144000"/>
@@ -223,7 +226,7 @@
           <a:p>
             <a:fld id="{D7D957CA-CF98-8043-9603-CE55C9AA4EB4}" type="datetimeFigureOut">
               <a:rPr lang="en-US" smtClean="0"/>
-              <a:t>11/13/18</a:t>
+              <a:t>11/14/18</a:t>
             </a:fld>
             <a:endParaRPr lang="en-US"/>
           </a:p>
@@ -1627,7 +1630,7 @@
           <a:p>
             <a:fld id="{46178A07-B99C-8645-B3C3-DADAA18BD985}" type="datetimeFigureOut">
               <a:rPr lang="en-US" smtClean="0"/>
-              <a:t>11/13/18</a:t>
+              <a:t>11/14/18</a:t>
             </a:fld>
             <a:endParaRPr lang="en-US"/>
           </a:p>
@@ -1825,7 +1828,7 @@
           <a:p>
             <a:fld id="{46178A07-B99C-8645-B3C3-DADAA18BD985}" type="datetimeFigureOut">
               <a:rPr lang="en-US" smtClean="0"/>
-              <a:t>11/13/18</a:t>
+              <a:t>11/14/18</a:t>
             </a:fld>
             <a:endParaRPr lang="en-US"/>
           </a:p>
@@ -2033,7 +2036,7 @@
           <a:p>
             <a:fld id="{46178A07-B99C-8645-B3C3-DADAA18BD985}" type="datetimeFigureOut">
               <a:rPr lang="en-US" smtClean="0"/>
-              <a:t>11/13/18</a:t>
+              <a:t>11/14/18</a:t>
             </a:fld>
             <a:endParaRPr lang="en-US"/>
           </a:p>
@@ -2231,7 +2234,7 @@
           <a:p>
             <a:fld id="{46178A07-B99C-8645-B3C3-DADAA18BD985}" type="datetimeFigureOut">
               <a:rPr lang="en-US" smtClean="0"/>
-              <a:t>11/13/18</a:t>
+              <a:t>11/14/18</a:t>
             </a:fld>
             <a:endParaRPr lang="en-US"/>
           </a:p>
@@ -2506,7 +2509,7 @@
           <a:p>
             <a:fld id="{46178A07-B99C-8645-B3C3-DADAA18BD985}" type="datetimeFigureOut">
               <a:rPr lang="en-US" smtClean="0"/>
-              <a:t>11/13/18</a:t>
+              <a:t>11/14/18</a:t>
             </a:fld>
             <a:endParaRPr lang="en-US"/>
           </a:p>
@@ -2771,7 +2774,7 @@
           <a:p>
             <a:fld id="{46178A07-B99C-8645-B3C3-DADAA18BD985}" type="datetimeFigureOut">
               <a:rPr lang="en-US" smtClean="0"/>
-              <a:t>11/13/18</a:t>
+              <a:t>11/14/18</a:t>
             </a:fld>
             <a:endParaRPr lang="en-US"/>
           </a:p>
@@ -3183,7 +3186,7 @@
           <a:p>
             <a:fld id="{46178A07-B99C-8645-B3C3-DADAA18BD985}" type="datetimeFigureOut">
               <a:rPr lang="en-US" smtClean="0"/>
-              <a:t>11/13/18</a:t>
+              <a:t>11/14/18</a:t>
             </a:fld>
             <a:endParaRPr lang="en-US"/>
           </a:p>
@@ -3324,7 +3327,7 @@
           <a:p>
             <a:fld id="{46178A07-B99C-8645-B3C3-DADAA18BD985}" type="datetimeFigureOut">
               <a:rPr lang="en-US" smtClean="0"/>
-              <a:t>11/13/18</a:t>
+              <a:t>11/14/18</a:t>
             </a:fld>
             <a:endParaRPr lang="en-US"/>
           </a:p>
@@ -3437,7 +3440,7 @@
           <a:p>
             <a:fld id="{46178A07-B99C-8645-B3C3-DADAA18BD985}" type="datetimeFigureOut">
               <a:rPr lang="en-US" smtClean="0"/>
-              <a:t>11/13/18</a:t>
+              <a:t>11/14/18</a:t>
             </a:fld>
             <a:endParaRPr lang="en-US"/>
           </a:p>
@@ -3748,7 +3751,7 @@
           <a:p>
             <a:fld id="{46178A07-B99C-8645-B3C3-DADAA18BD985}" type="datetimeFigureOut">
               <a:rPr lang="en-US" smtClean="0"/>
-              <a:t>11/13/18</a:t>
+              <a:t>11/14/18</a:t>
             </a:fld>
             <a:endParaRPr lang="en-US"/>
           </a:p>
@@ -4036,7 +4039,7 @@
           <a:p>
             <a:fld id="{46178A07-B99C-8645-B3C3-DADAA18BD985}" type="datetimeFigureOut">
               <a:rPr lang="en-US" smtClean="0"/>
-              <a:t>11/13/18</a:t>
+              <a:t>11/14/18</a:t>
             </a:fld>
             <a:endParaRPr lang="en-US"/>
           </a:p>
@@ -4277,7 +4280,7 @@
           <a:p>
             <a:fld id="{46178A07-B99C-8645-B3C3-DADAA18BD985}" type="datetimeFigureOut">
               <a:rPr lang="en-US" smtClean="0"/>
-              <a:t>11/13/18</a:t>
+              <a:t>11/14/18</a:t>
             </a:fld>
             <a:endParaRPr lang="en-US"/>
           </a:p>
@@ -6105,6 +6108,671 @@
     <p:extLst>
       <p:ext uri="{BB962C8B-B14F-4D97-AF65-F5344CB8AC3E}">
         <p14:creationId xmlns:p14="http://schemas.microsoft.com/office/powerpoint/2010/main" val="38925588"/>
+      </p:ext>
+    </p:extLst>
+  </p:cSld>
+  <p:clrMapOvr>
+    <a:masterClrMapping/>
+  </p:clrMapOvr>
+</p:sld>
+</file>
+
+<file path=ppt/slides/slide16.xml><?xml version="1.0" encoding="utf-8"?>
+<p:sld xmlns:a="http://schemas.openxmlformats.org/drawingml/2006/main" xmlns:r="http://schemas.openxmlformats.org/officeDocument/2006/relationships" xmlns:p="http://schemas.openxmlformats.org/presentationml/2006/main">
+  <p:cSld>
+    <p:spTree>
+      <p:nvGrpSpPr>
+        <p:cNvPr id="1" name=""/>
+        <p:cNvGrpSpPr/>
+        <p:nvPr/>
+      </p:nvGrpSpPr>
+      <p:grpSpPr>
+        <a:xfrm>
+          <a:off x="0" y="0"/>
+          <a:ext cx="0" cy="0"/>
+          <a:chOff x="0" y="0"/>
+          <a:chExt cx="0" cy="0"/>
+        </a:xfrm>
+      </p:grpSpPr>
+      <p:sp>
+        <p:nvSpPr>
+          <p:cNvPr id="2" name="Title 1">
+            <a:extLst>
+              <a:ext uri="{FF2B5EF4-FFF2-40B4-BE49-F238E27FC236}">
+                <a16:creationId xmlns:a16="http://schemas.microsoft.com/office/drawing/2014/main" id="{C710704E-CFFD-B840-AD89-2D2E96211616}"/>
+              </a:ext>
+            </a:extLst>
+          </p:cNvPr>
+          <p:cNvSpPr>
+            <a:spLocks noGrp="1"/>
+          </p:cNvSpPr>
+          <p:nvPr>
+            <p:ph type="title"/>
+          </p:nvPr>
+        </p:nvSpPr>
+        <p:spPr/>
+        <p:txBody>
+          <a:bodyPr>
+            <a:normAutofit/>
+          </a:bodyPr>
+          <a:lstStyle/>
+          <a:p>
+            <a:r>
+              <a:rPr lang="en-ID" sz="4000" dirty="0">
+                <a:latin typeface="Helvetica" pitchFamily="2" charset="0"/>
+              </a:rPr>
+              <a:t>Style an Ionic Component on a Single Page</a:t>
+            </a:r>
+            <a:endParaRPr lang="en-US" sz="4000" dirty="0">
+              <a:latin typeface="Helvetica" pitchFamily="2" charset="0"/>
+            </a:endParaRPr>
+          </a:p>
+        </p:txBody>
+      </p:sp>
+      <p:pic>
+        <p:nvPicPr>
+          <p:cNvPr id="5" name="Picture 4">
+            <a:extLst>
+              <a:ext uri="{FF2B5EF4-FFF2-40B4-BE49-F238E27FC236}">
+                <a16:creationId xmlns:a16="http://schemas.microsoft.com/office/drawing/2014/main" id="{29C561F3-3BB6-0644-B142-EAECEDE6C481}"/>
+              </a:ext>
+            </a:extLst>
+          </p:cNvPr>
+          <p:cNvPicPr>
+            <a:picLocks noChangeAspect="1"/>
+          </p:cNvPicPr>
+          <p:nvPr/>
+        </p:nvPicPr>
+        <p:blipFill>
+          <a:blip r:embed="rId2"/>
+          <a:stretch>
+            <a:fillRect/>
+          </a:stretch>
+        </p:blipFill>
+        <p:spPr>
+          <a:xfrm>
+            <a:off x="6154057" y="1392919"/>
+            <a:ext cx="5352220" cy="4761138"/>
+          </a:xfrm>
+          <a:prstGeom prst="rect">
+            <a:avLst/>
+          </a:prstGeom>
+        </p:spPr>
+      </p:pic>
+      <p:pic>
+        <p:nvPicPr>
+          <p:cNvPr id="10" name="Picture 9">
+            <a:extLst>
+              <a:ext uri="{FF2B5EF4-FFF2-40B4-BE49-F238E27FC236}">
+                <a16:creationId xmlns:a16="http://schemas.microsoft.com/office/drawing/2014/main" id="{E44F93C8-CB44-9649-BF9D-0D5CE01E0DD9}"/>
+              </a:ext>
+            </a:extLst>
+          </p:cNvPr>
+          <p:cNvPicPr>
+            <a:picLocks noChangeAspect="1"/>
+          </p:cNvPicPr>
+          <p:nvPr/>
+        </p:nvPicPr>
+        <p:blipFill>
+          <a:blip r:embed="rId3"/>
+          <a:stretch>
+            <a:fillRect/>
+          </a:stretch>
+        </p:blipFill>
+        <p:spPr>
+          <a:xfrm>
+            <a:off x="494182" y="1392919"/>
+            <a:ext cx="5443156" cy="4761138"/>
+          </a:xfrm>
+          <a:prstGeom prst="rect">
+            <a:avLst/>
+          </a:prstGeom>
+        </p:spPr>
+      </p:pic>
+      <p:sp>
+        <p:nvSpPr>
+          <p:cNvPr id="11" name="Chevron 10">
+            <a:extLst>
+              <a:ext uri="{FF2B5EF4-FFF2-40B4-BE49-F238E27FC236}">
+                <a16:creationId xmlns:a16="http://schemas.microsoft.com/office/drawing/2014/main" id="{E013BF6B-B382-9043-A37D-8361C5CD9595}"/>
+              </a:ext>
+            </a:extLst>
+          </p:cNvPr>
+          <p:cNvSpPr/>
+          <p:nvPr/>
+        </p:nvSpPr>
+        <p:spPr>
+          <a:xfrm>
+            <a:off x="5646555" y="3058544"/>
+            <a:ext cx="798286" cy="1063511"/>
+          </a:xfrm>
+          <a:prstGeom prst="chevron">
+            <a:avLst/>
+          </a:prstGeom>
+        </p:spPr>
+        <p:style>
+          <a:lnRef idx="2">
+            <a:schemeClr val="accent2">
+              <a:shade val="50000"/>
+            </a:schemeClr>
+          </a:lnRef>
+          <a:fillRef idx="1">
+            <a:schemeClr val="accent2"/>
+          </a:fillRef>
+          <a:effectRef idx="0">
+            <a:schemeClr val="accent2"/>
+          </a:effectRef>
+          <a:fontRef idx="minor">
+            <a:schemeClr val="lt1"/>
+          </a:fontRef>
+        </p:style>
+        <p:txBody>
+          <a:bodyPr rtlCol="0" anchor="ctr"/>
+          <a:lstStyle/>
+          <a:p>
+            <a:pPr algn="ctr"/>
+            <a:endParaRPr lang="en-US">
+              <a:solidFill>
+                <a:schemeClr val="tx1"/>
+              </a:solidFill>
+            </a:endParaRPr>
+          </a:p>
+        </p:txBody>
+      </p:sp>
+      <p:sp>
+        <p:nvSpPr>
+          <p:cNvPr id="12" name="TextBox 11">
+            <a:extLst>
+              <a:ext uri="{FF2B5EF4-FFF2-40B4-BE49-F238E27FC236}">
+                <a16:creationId xmlns:a16="http://schemas.microsoft.com/office/drawing/2014/main" id="{1011B418-3E7C-6B4B-B2B4-48A51339029E}"/>
+              </a:ext>
+            </a:extLst>
+          </p:cNvPr>
+          <p:cNvSpPr txBox="1"/>
+          <p:nvPr/>
+        </p:nvSpPr>
+        <p:spPr>
+          <a:xfrm>
+            <a:off x="9590176" y="6154057"/>
+            <a:ext cx="1763624" cy="461665"/>
+          </a:xfrm>
+          <a:prstGeom prst="rect">
+            <a:avLst/>
+          </a:prstGeom>
+          <a:noFill/>
+        </p:spPr>
+        <p:txBody>
+          <a:bodyPr wrap="none" rtlCol="0">
+            <a:spAutoFit/>
+          </a:bodyPr>
+          <a:lstStyle/>
+          <a:p>
+            <a:r>
+              <a:rPr lang="en-US" sz="2400" b="1" dirty="0" err="1">
+                <a:solidFill>
+                  <a:srgbClr val="436FBF"/>
+                </a:solidFill>
+                <a:latin typeface="Helvetica Neue" panose="02000503000000020004" pitchFamily="2" charset="0"/>
+                <a:ea typeface="Helvetica Neue" panose="02000503000000020004" pitchFamily="2" charset="0"/>
+                <a:cs typeface="Helvetica Neue" panose="02000503000000020004" pitchFamily="2" charset="0"/>
+              </a:rPr>
+              <a:t>about.html</a:t>
+            </a:r>
+            <a:endParaRPr lang="en-US" sz="2400" b="1" dirty="0">
+              <a:solidFill>
+                <a:srgbClr val="436FBF"/>
+              </a:solidFill>
+              <a:latin typeface="Helvetica Neue" panose="02000503000000020004" pitchFamily="2" charset="0"/>
+              <a:ea typeface="Helvetica Neue" panose="02000503000000020004" pitchFamily="2" charset="0"/>
+              <a:cs typeface="Helvetica Neue" panose="02000503000000020004" pitchFamily="2" charset="0"/>
+            </a:endParaRPr>
+          </a:p>
+        </p:txBody>
+      </p:sp>
+      <p:sp>
+        <p:nvSpPr>
+          <p:cNvPr id="13" name="Frame 12">
+            <a:extLst>
+              <a:ext uri="{FF2B5EF4-FFF2-40B4-BE49-F238E27FC236}">
+                <a16:creationId xmlns:a16="http://schemas.microsoft.com/office/drawing/2014/main" id="{83BF8738-9997-B940-BC30-A4D595AF582B}"/>
+              </a:ext>
+            </a:extLst>
+          </p:cNvPr>
+          <p:cNvSpPr/>
+          <p:nvPr/>
+        </p:nvSpPr>
+        <p:spPr>
+          <a:xfrm>
+            <a:off x="6256155" y="4412343"/>
+            <a:ext cx="1146130" cy="391886"/>
+          </a:xfrm>
+          <a:prstGeom prst="frame">
+            <a:avLst/>
+          </a:prstGeom>
+          <a:solidFill>
+            <a:schemeClr val="accent2"/>
+          </a:solidFill>
+          <a:ln>
+            <a:solidFill>
+              <a:schemeClr val="accent2"/>
+            </a:solidFill>
+          </a:ln>
+        </p:spPr>
+        <p:style>
+          <a:lnRef idx="2">
+            <a:schemeClr val="accent1">
+              <a:shade val="50000"/>
+            </a:schemeClr>
+          </a:lnRef>
+          <a:fillRef idx="1">
+            <a:schemeClr val="accent1"/>
+          </a:fillRef>
+          <a:effectRef idx="0">
+            <a:schemeClr val="accent1"/>
+          </a:effectRef>
+          <a:fontRef idx="minor">
+            <a:schemeClr val="lt1"/>
+          </a:fontRef>
+        </p:style>
+        <p:txBody>
+          <a:bodyPr rtlCol="0" anchor="ctr"/>
+          <a:lstStyle/>
+          <a:p>
+            <a:pPr algn="ctr"/>
+            <a:endParaRPr lang="en-US">
+              <a:solidFill>
+                <a:schemeClr val="tx1"/>
+              </a:solidFill>
+            </a:endParaRPr>
+          </a:p>
+        </p:txBody>
+      </p:sp>
+      <p:sp>
+        <p:nvSpPr>
+          <p:cNvPr id="14" name="Frame 13">
+            <a:extLst>
+              <a:ext uri="{FF2B5EF4-FFF2-40B4-BE49-F238E27FC236}">
+                <a16:creationId xmlns:a16="http://schemas.microsoft.com/office/drawing/2014/main" id="{28CE1294-A50E-184A-9CF9-6FE24B2D15F3}"/>
+              </a:ext>
+            </a:extLst>
+          </p:cNvPr>
+          <p:cNvSpPr/>
+          <p:nvPr/>
+        </p:nvSpPr>
+        <p:spPr>
+          <a:xfrm>
+            <a:off x="6154057" y="5334419"/>
+            <a:ext cx="2662772" cy="391886"/>
+          </a:xfrm>
+          <a:prstGeom prst="frame">
+            <a:avLst/>
+          </a:prstGeom>
+          <a:solidFill>
+            <a:schemeClr val="accent2"/>
+          </a:solidFill>
+          <a:ln>
+            <a:noFill/>
+          </a:ln>
+        </p:spPr>
+        <p:style>
+          <a:lnRef idx="2">
+            <a:schemeClr val="accent1">
+              <a:shade val="50000"/>
+            </a:schemeClr>
+          </a:lnRef>
+          <a:fillRef idx="1">
+            <a:schemeClr val="accent1"/>
+          </a:fillRef>
+          <a:effectRef idx="0">
+            <a:schemeClr val="accent1"/>
+          </a:effectRef>
+          <a:fontRef idx="minor">
+            <a:schemeClr val="lt1"/>
+          </a:fontRef>
+        </p:style>
+        <p:txBody>
+          <a:bodyPr rtlCol="0" anchor="ctr"/>
+          <a:lstStyle/>
+          <a:p>
+            <a:pPr algn="ctr"/>
+            <a:endParaRPr lang="en-US">
+              <a:solidFill>
+                <a:schemeClr val="tx1"/>
+              </a:solidFill>
+            </a:endParaRPr>
+          </a:p>
+        </p:txBody>
+      </p:sp>
+    </p:spTree>
+    <p:extLst>
+      <p:ext uri="{BB962C8B-B14F-4D97-AF65-F5344CB8AC3E}">
+        <p14:creationId xmlns:p14="http://schemas.microsoft.com/office/powerpoint/2010/main" val="1987987591"/>
+      </p:ext>
+    </p:extLst>
+  </p:cSld>
+  <p:clrMapOvr>
+    <a:masterClrMapping/>
+  </p:clrMapOvr>
+</p:sld>
+</file>
+
+<file path=ppt/slides/slide17.xml><?xml version="1.0" encoding="utf-8"?>
+<p:sld xmlns:a="http://schemas.openxmlformats.org/drawingml/2006/main" xmlns:r="http://schemas.openxmlformats.org/officeDocument/2006/relationships" xmlns:p="http://schemas.openxmlformats.org/presentationml/2006/main">
+  <p:cSld>
+    <p:spTree>
+      <p:nvGrpSpPr>
+        <p:cNvPr id="1" name=""/>
+        <p:cNvGrpSpPr/>
+        <p:nvPr/>
+      </p:nvGrpSpPr>
+      <p:grpSpPr>
+        <a:xfrm>
+          <a:off x="0" y="0"/>
+          <a:ext cx="0" cy="0"/>
+          <a:chOff x="0" y="0"/>
+          <a:chExt cx="0" cy="0"/>
+        </a:xfrm>
+      </p:grpSpPr>
+      <p:sp>
+        <p:nvSpPr>
+          <p:cNvPr id="2" name="Title 1">
+            <a:extLst>
+              <a:ext uri="{FF2B5EF4-FFF2-40B4-BE49-F238E27FC236}">
+                <a16:creationId xmlns:a16="http://schemas.microsoft.com/office/drawing/2014/main" id="{C710704E-CFFD-B840-AD89-2D2E96211616}"/>
+              </a:ext>
+            </a:extLst>
+          </p:cNvPr>
+          <p:cNvSpPr>
+            <a:spLocks noGrp="1"/>
+          </p:cNvSpPr>
+          <p:nvPr>
+            <p:ph type="title"/>
+          </p:nvPr>
+        </p:nvSpPr>
+        <p:spPr/>
+        <p:txBody>
+          <a:bodyPr>
+            <a:normAutofit/>
+          </a:bodyPr>
+          <a:lstStyle/>
+          <a:p>
+            <a:r>
+              <a:rPr lang="en-ID" sz="4000" dirty="0">
+                <a:latin typeface="Helvetica" pitchFamily="2" charset="0"/>
+              </a:rPr>
+              <a:t>Style an Ionic Component on a Single Page</a:t>
+            </a:r>
+            <a:endParaRPr lang="en-US" sz="4000" dirty="0">
+              <a:latin typeface="Helvetica" pitchFamily="2" charset="0"/>
+            </a:endParaRPr>
+          </a:p>
+        </p:txBody>
+      </p:sp>
+      <p:pic>
+        <p:nvPicPr>
+          <p:cNvPr id="5" name="Picture 4">
+            <a:extLst>
+              <a:ext uri="{FF2B5EF4-FFF2-40B4-BE49-F238E27FC236}">
+                <a16:creationId xmlns:a16="http://schemas.microsoft.com/office/drawing/2014/main" id="{6F07D465-C333-EE4E-A29E-8FC5AD4454E4}"/>
+              </a:ext>
+            </a:extLst>
+          </p:cNvPr>
+          <p:cNvPicPr>
+            <a:picLocks noChangeAspect="1"/>
+          </p:cNvPicPr>
+          <p:nvPr/>
+        </p:nvPicPr>
+        <p:blipFill>
+          <a:blip r:embed="rId2"/>
+          <a:stretch>
+            <a:fillRect/>
+          </a:stretch>
+        </p:blipFill>
+        <p:spPr>
+          <a:xfrm>
+            <a:off x="838200" y="1690688"/>
+            <a:ext cx="3835400" cy="3937000"/>
+          </a:xfrm>
+          <a:prstGeom prst="rect">
+            <a:avLst/>
+          </a:prstGeom>
+        </p:spPr>
+      </p:pic>
+      <p:pic>
+        <p:nvPicPr>
+          <p:cNvPr id="7" name="Picture 6">
+            <a:extLst>
+              <a:ext uri="{FF2B5EF4-FFF2-40B4-BE49-F238E27FC236}">
+                <a16:creationId xmlns:a16="http://schemas.microsoft.com/office/drawing/2014/main" id="{51CFD23D-C3A9-7D4A-A5E6-FC6CC50C3F48}"/>
+              </a:ext>
+            </a:extLst>
+          </p:cNvPr>
+          <p:cNvPicPr>
+            <a:picLocks noChangeAspect="1"/>
+          </p:cNvPicPr>
+          <p:nvPr/>
+        </p:nvPicPr>
+        <p:blipFill>
+          <a:blip r:embed="rId3"/>
+          <a:stretch>
+            <a:fillRect/>
+          </a:stretch>
+        </p:blipFill>
+        <p:spPr>
+          <a:xfrm>
+            <a:off x="5201587" y="1690688"/>
+            <a:ext cx="4313250" cy="4979935"/>
+          </a:xfrm>
+          <a:prstGeom prst="rect">
+            <a:avLst/>
+          </a:prstGeom>
+        </p:spPr>
+      </p:pic>
+      <p:sp>
+        <p:nvSpPr>
+          <p:cNvPr id="9" name="Frame 8">
+            <a:extLst>
+              <a:ext uri="{FF2B5EF4-FFF2-40B4-BE49-F238E27FC236}">
+                <a16:creationId xmlns:a16="http://schemas.microsoft.com/office/drawing/2014/main" id="{8F3291D4-2B13-094D-9F70-F9A7DA087D55}"/>
+              </a:ext>
+            </a:extLst>
+          </p:cNvPr>
+          <p:cNvSpPr/>
+          <p:nvPr/>
+        </p:nvSpPr>
+        <p:spPr>
+          <a:xfrm>
+            <a:off x="4764614" y="3267302"/>
+            <a:ext cx="5143884" cy="735072"/>
+          </a:xfrm>
+          <a:prstGeom prst="frame">
+            <a:avLst/>
+          </a:prstGeom>
+          <a:solidFill>
+            <a:schemeClr val="accent2"/>
+          </a:solidFill>
+          <a:ln>
+            <a:noFill/>
+          </a:ln>
+        </p:spPr>
+        <p:style>
+          <a:lnRef idx="2">
+            <a:schemeClr val="accent1">
+              <a:shade val="50000"/>
+            </a:schemeClr>
+          </a:lnRef>
+          <a:fillRef idx="1">
+            <a:schemeClr val="accent1"/>
+          </a:fillRef>
+          <a:effectRef idx="0">
+            <a:schemeClr val="accent1"/>
+          </a:effectRef>
+          <a:fontRef idx="minor">
+            <a:schemeClr val="lt1"/>
+          </a:fontRef>
+        </p:style>
+        <p:txBody>
+          <a:bodyPr rtlCol="0" anchor="ctr"/>
+          <a:lstStyle/>
+          <a:p>
+            <a:pPr algn="ctr"/>
+            <a:endParaRPr lang="en-US">
+              <a:solidFill>
+                <a:schemeClr val="tx1"/>
+              </a:solidFill>
+            </a:endParaRPr>
+          </a:p>
+        </p:txBody>
+      </p:sp>
+    </p:spTree>
+    <p:extLst>
+      <p:ext uri="{BB962C8B-B14F-4D97-AF65-F5344CB8AC3E}">
+        <p14:creationId xmlns:p14="http://schemas.microsoft.com/office/powerpoint/2010/main" val="3358306019"/>
+      </p:ext>
+    </p:extLst>
+  </p:cSld>
+  <p:clrMapOvr>
+    <a:masterClrMapping/>
+  </p:clrMapOvr>
+</p:sld>
+</file>
+
+<file path=ppt/slides/slide18.xml><?xml version="1.0" encoding="utf-8"?>
+<p:sld xmlns:a="http://schemas.openxmlformats.org/drawingml/2006/main" xmlns:r="http://schemas.openxmlformats.org/officeDocument/2006/relationships" xmlns:p="http://schemas.openxmlformats.org/presentationml/2006/main">
+  <p:cSld>
+    <p:spTree>
+      <p:nvGrpSpPr>
+        <p:cNvPr id="1" name=""/>
+        <p:cNvGrpSpPr/>
+        <p:nvPr/>
+      </p:nvGrpSpPr>
+      <p:grpSpPr>
+        <a:xfrm>
+          <a:off x="0" y="0"/>
+          <a:ext cx="0" cy="0"/>
+          <a:chOff x="0" y="0"/>
+          <a:chExt cx="0" cy="0"/>
+        </a:xfrm>
+      </p:grpSpPr>
+      <p:sp>
+        <p:nvSpPr>
+          <p:cNvPr id="2" name="Title 1">
+            <a:extLst>
+              <a:ext uri="{FF2B5EF4-FFF2-40B4-BE49-F238E27FC236}">
+                <a16:creationId xmlns:a16="http://schemas.microsoft.com/office/drawing/2014/main" id="{C710704E-CFFD-B840-AD89-2D2E96211616}"/>
+              </a:ext>
+            </a:extLst>
+          </p:cNvPr>
+          <p:cNvSpPr>
+            <a:spLocks noGrp="1"/>
+          </p:cNvSpPr>
+          <p:nvPr>
+            <p:ph type="title"/>
+          </p:nvPr>
+        </p:nvSpPr>
+        <p:spPr/>
+        <p:txBody>
+          <a:bodyPr>
+            <a:normAutofit/>
+          </a:bodyPr>
+          <a:lstStyle/>
+          <a:p>
+            <a:r>
+              <a:rPr lang="en-ID" sz="4000" dirty="0">
+                <a:latin typeface="Helvetica" pitchFamily="2" charset="0"/>
+              </a:rPr>
+              <a:t>Style an Ionic Component on a Single Page</a:t>
+            </a:r>
+            <a:endParaRPr lang="en-US" sz="4000" dirty="0">
+              <a:latin typeface="Helvetica" pitchFamily="2" charset="0"/>
+            </a:endParaRPr>
+          </a:p>
+        </p:txBody>
+      </p:sp>
+      <p:pic>
+        <p:nvPicPr>
+          <p:cNvPr id="4" name="Picture 3">
+            <a:extLst>
+              <a:ext uri="{FF2B5EF4-FFF2-40B4-BE49-F238E27FC236}">
+                <a16:creationId xmlns:a16="http://schemas.microsoft.com/office/drawing/2014/main" id="{B12ECF89-BEE3-4C4D-BDB5-5549B2E1C8E6}"/>
+              </a:ext>
+            </a:extLst>
+          </p:cNvPr>
+          <p:cNvPicPr>
+            <a:picLocks noChangeAspect="1"/>
+          </p:cNvPicPr>
+          <p:nvPr/>
+        </p:nvPicPr>
+        <p:blipFill>
+          <a:blip r:embed="rId2"/>
+          <a:stretch>
+            <a:fillRect/>
+          </a:stretch>
+        </p:blipFill>
+        <p:spPr>
+          <a:xfrm>
+            <a:off x="943132" y="2680039"/>
+            <a:ext cx="7099300" cy="2908300"/>
+          </a:xfrm>
+          <a:prstGeom prst="rect">
+            <a:avLst/>
+          </a:prstGeom>
+        </p:spPr>
+      </p:pic>
+      <p:sp>
+        <p:nvSpPr>
+          <p:cNvPr id="15" name="TextBox 14">
+            <a:extLst>
+              <a:ext uri="{FF2B5EF4-FFF2-40B4-BE49-F238E27FC236}">
+                <a16:creationId xmlns:a16="http://schemas.microsoft.com/office/drawing/2014/main" id="{2D3F58C7-DEF5-EE46-B377-1223C1BD5950}"/>
+              </a:ext>
+            </a:extLst>
+          </p:cNvPr>
+          <p:cNvSpPr txBox="1"/>
+          <p:nvPr/>
+        </p:nvSpPr>
+        <p:spPr>
+          <a:xfrm>
+            <a:off x="943132" y="2091723"/>
+            <a:ext cx="1784463" cy="461665"/>
+          </a:xfrm>
+          <a:prstGeom prst="rect">
+            <a:avLst/>
+          </a:prstGeom>
+          <a:noFill/>
+        </p:spPr>
+        <p:txBody>
+          <a:bodyPr wrap="none" rtlCol="0">
+            <a:spAutoFit/>
+          </a:bodyPr>
+          <a:lstStyle/>
+          <a:p>
+            <a:r>
+              <a:rPr lang="en-US" sz="2400" b="1" dirty="0" err="1">
+                <a:solidFill>
+                  <a:srgbClr val="436FBF"/>
+                </a:solidFill>
+                <a:latin typeface="Helvetica Neue" panose="02000503000000020004" pitchFamily="2" charset="0"/>
+                <a:ea typeface="Helvetica Neue" panose="02000503000000020004" pitchFamily="2" charset="0"/>
+                <a:cs typeface="Helvetica Neue" panose="02000503000000020004" pitchFamily="2" charset="0"/>
+              </a:rPr>
+              <a:t>about.sass</a:t>
+            </a:r>
+            <a:endParaRPr lang="en-US" sz="2400" b="1" dirty="0">
+              <a:solidFill>
+                <a:srgbClr val="436FBF"/>
+              </a:solidFill>
+              <a:latin typeface="Helvetica Neue" panose="02000503000000020004" pitchFamily="2" charset="0"/>
+              <a:ea typeface="Helvetica Neue" panose="02000503000000020004" pitchFamily="2" charset="0"/>
+              <a:cs typeface="Helvetica Neue" panose="02000503000000020004" pitchFamily="2" charset="0"/>
+            </a:endParaRPr>
+          </a:p>
+        </p:txBody>
+      </p:sp>
+    </p:spTree>
+    <p:extLst>
+      <p:ext uri="{BB962C8B-B14F-4D97-AF65-F5344CB8AC3E}">
+        <p14:creationId xmlns:p14="http://schemas.microsoft.com/office/powerpoint/2010/main" val="1368296396"/>
       </p:ext>
     </p:extLst>
   </p:cSld>

</xml_diff>